<commit_message>
Add event-based change handling for workpiece and all members
</commit_message>
<xml_diff>
--- a/Docs/ShopToolsSketches.pptx
+++ b/Docs/ShopToolsSketches.pptx
@@ -16,6 +16,7 @@
     <p:sldId id="264" r:id="rId10"/>
     <p:sldId id="265" r:id="rId11"/>
     <p:sldId id="266" r:id="rId12"/>
+    <p:sldId id="267" r:id="rId13"/>
   </p:sldIdLst>
   <p:sldSz cx="12192000" cy="6858000"/>
   <p:notesSz cx="6858000" cy="9144000"/>
@@ -125,13 +126,173 @@
 <file path=ppt/revisionInfo.xml><?xml version="1.0" encoding="utf-8"?>
 <p1510:revInfo xmlns:a="http://schemas.openxmlformats.org/drawingml/2006/main" xmlns:r="http://schemas.openxmlformats.org/officeDocument/2006/relationships" xmlns:p1510="http://schemas.microsoft.com/office/powerpoint/2015/10/main">
   <p1510:revLst>
-    <p1510:client id="{95C81F28-B0C4-4470-9E1B-0F770489298E}" v="39" dt="2025-01-27T23:04:28.333"/>
+    <p1510:client id="{8AA51869-D50E-4754-B7C3-5AFB8DF1412D}" v="16" dt="2025-02-12T14:44:37.522"/>
   </p1510:revLst>
 </p1510:revInfo>
 </file>
 
 <file path=ppt/changesInfos/changesInfo1.xml><?xml version="1.0" encoding="utf-8"?>
 <pc:chgInfo xmlns:a="http://schemas.openxmlformats.org/drawingml/2006/main" xmlns:r="http://schemas.openxmlformats.org/officeDocument/2006/relationships" xmlns:ac="http://schemas.microsoft.com/office/drawing/2013/main/command" xmlns:pc="http://schemas.microsoft.com/office/powerpoint/2013/main/command">
+  <pc:docChgLst>
+    <pc:chgData name="Daniel Patterson" userId="48df8f255f7bda56" providerId="LiveId" clId="{8AA51869-D50E-4754-B7C3-5AFB8DF1412D}"/>
+    <pc:docChg chg="undo custSel addSld modSld">
+      <pc:chgData name="Daniel Patterson" userId="48df8f255f7bda56" providerId="LiveId" clId="{8AA51869-D50E-4754-B7C3-5AFB8DF1412D}" dt="2025-02-12T14:44:51.013" v="283" actId="1076"/>
+      <pc:docMkLst>
+        <pc:docMk/>
+      </pc:docMkLst>
+      <pc:sldChg chg="addSp modSp new mod">
+        <pc:chgData name="Daniel Patterson" userId="48df8f255f7bda56" providerId="LiveId" clId="{8AA51869-D50E-4754-B7C3-5AFB8DF1412D}" dt="2025-02-12T14:44:51.013" v="283" actId="1076"/>
+        <pc:sldMkLst>
+          <pc:docMk/>
+          <pc:sldMk cId="2713533969" sldId="267"/>
+        </pc:sldMkLst>
+        <pc:spChg chg="add mod">
+          <ac:chgData name="Daniel Patterson" userId="48df8f255f7bda56" providerId="LiveId" clId="{8AA51869-D50E-4754-B7C3-5AFB8DF1412D}" dt="2025-02-12T14:44:37.521" v="282" actId="164"/>
+          <ac:spMkLst>
+            <pc:docMk/>
+            <pc:sldMk cId="2713533969" sldId="267"/>
+            <ac:spMk id="2" creationId="{9B4B47E0-9148-7DA4-36F0-AA5E10C229C8}"/>
+          </ac:spMkLst>
+        </pc:spChg>
+        <pc:spChg chg="add mod">
+          <ac:chgData name="Daniel Patterson" userId="48df8f255f7bda56" providerId="LiveId" clId="{8AA51869-D50E-4754-B7C3-5AFB8DF1412D}" dt="2025-02-12T14:44:37.521" v="282" actId="164"/>
+          <ac:spMkLst>
+            <pc:docMk/>
+            <pc:sldMk cId="2713533969" sldId="267"/>
+            <ac:spMk id="3" creationId="{727EACA3-D695-538C-EFB5-EF7032060665}"/>
+          </ac:spMkLst>
+        </pc:spChg>
+        <pc:spChg chg="add mod">
+          <ac:chgData name="Daniel Patterson" userId="48df8f255f7bda56" providerId="LiveId" clId="{8AA51869-D50E-4754-B7C3-5AFB8DF1412D}" dt="2025-02-12T14:44:37.521" v="282" actId="164"/>
+          <ac:spMkLst>
+            <pc:docMk/>
+            <pc:sldMk cId="2713533969" sldId="267"/>
+            <ac:spMk id="4" creationId="{A4D9662F-E93B-F6B5-B100-CDF66E428854}"/>
+          </ac:spMkLst>
+        </pc:spChg>
+        <pc:spChg chg="add mod">
+          <ac:chgData name="Daniel Patterson" userId="48df8f255f7bda56" providerId="LiveId" clId="{8AA51869-D50E-4754-B7C3-5AFB8DF1412D}" dt="2025-02-12T14:44:37.521" v="282" actId="164"/>
+          <ac:spMkLst>
+            <pc:docMk/>
+            <pc:sldMk cId="2713533969" sldId="267"/>
+            <ac:spMk id="5" creationId="{6A671550-22B8-CB3E-F308-325592412EB4}"/>
+          </ac:spMkLst>
+        </pc:spChg>
+        <pc:spChg chg="add mod">
+          <ac:chgData name="Daniel Patterson" userId="48df8f255f7bda56" providerId="LiveId" clId="{8AA51869-D50E-4754-B7C3-5AFB8DF1412D}" dt="2025-02-12T14:37:52.262" v="125" actId="20577"/>
+          <ac:spMkLst>
+            <pc:docMk/>
+            <pc:sldMk cId="2713533969" sldId="267"/>
+            <ac:spMk id="6" creationId="{0E172290-6605-2D8F-4E6A-891C1BD30FF2}"/>
+          </ac:spMkLst>
+        </pc:spChg>
+        <pc:spChg chg="add mod">
+          <ac:chgData name="Daniel Patterson" userId="48df8f255f7bda56" providerId="LiveId" clId="{8AA51869-D50E-4754-B7C3-5AFB8DF1412D}" dt="2025-02-12T14:43:05.621" v="278" actId="164"/>
+          <ac:spMkLst>
+            <pc:docMk/>
+            <pc:sldMk cId="2713533969" sldId="267"/>
+            <ac:spMk id="7" creationId="{08794E35-8BC3-AACA-1F5C-AD1C5EF834C6}"/>
+          </ac:spMkLst>
+        </pc:spChg>
+        <pc:spChg chg="add mod">
+          <ac:chgData name="Daniel Patterson" userId="48df8f255f7bda56" providerId="LiveId" clId="{8AA51869-D50E-4754-B7C3-5AFB8DF1412D}" dt="2025-02-12T14:43:05.621" v="278" actId="164"/>
+          <ac:spMkLst>
+            <pc:docMk/>
+            <pc:sldMk cId="2713533969" sldId="267"/>
+            <ac:spMk id="8" creationId="{06EAA8C9-8862-F7AC-2B28-2BF7F4DBE49E}"/>
+          </ac:spMkLst>
+        </pc:spChg>
+        <pc:spChg chg="add mod">
+          <ac:chgData name="Daniel Patterson" userId="48df8f255f7bda56" providerId="LiveId" clId="{8AA51869-D50E-4754-B7C3-5AFB8DF1412D}" dt="2025-02-12T14:43:05.621" v="278" actId="164"/>
+          <ac:spMkLst>
+            <pc:docMk/>
+            <pc:sldMk cId="2713533969" sldId="267"/>
+            <ac:spMk id="9" creationId="{903336EB-A735-63F2-AB65-01E3828888AC}"/>
+          </ac:spMkLst>
+        </pc:spChg>
+        <pc:spChg chg="add mod">
+          <ac:chgData name="Daniel Patterson" userId="48df8f255f7bda56" providerId="LiveId" clId="{8AA51869-D50E-4754-B7C3-5AFB8DF1412D}" dt="2025-02-12T14:43:05.621" v="278" actId="164"/>
+          <ac:spMkLst>
+            <pc:docMk/>
+            <pc:sldMk cId="2713533969" sldId="267"/>
+            <ac:spMk id="10" creationId="{867A4BA6-94D6-900D-9C76-5946519BFB1A}"/>
+          </ac:spMkLst>
+        </pc:spChg>
+        <pc:spChg chg="add mod">
+          <ac:chgData name="Daniel Patterson" userId="48df8f255f7bda56" providerId="LiveId" clId="{8AA51869-D50E-4754-B7C3-5AFB8DF1412D}" dt="2025-02-12T14:42:29.212" v="277" actId="1076"/>
+          <ac:spMkLst>
+            <pc:docMk/>
+            <pc:sldMk cId="2713533969" sldId="267"/>
+            <ac:spMk id="11" creationId="{286C04CB-C408-9033-23FC-C7E7D01FAC38}"/>
+          </ac:spMkLst>
+        </pc:spChg>
+        <pc:spChg chg="add mod">
+          <ac:chgData name="Daniel Patterson" userId="48df8f255f7bda56" providerId="LiveId" clId="{8AA51869-D50E-4754-B7C3-5AFB8DF1412D}" dt="2025-02-12T14:43:05.621" v="278" actId="164"/>
+          <ac:spMkLst>
+            <pc:docMk/>
+            <pc:sldMk cId="2713533969" sldId="267"/>
+            <ac:spMk id="12" creationId="{07498AB8-4652-2648-9249-61075A0489EE}"/>
+          </ac:spMkLst>
+        </pc:spChg>
+        <pc:spChg chg="add mod">
+          <ac:chgData name="Daniel Patterson" userId="48df8f255f7bda56" providerId="LiveId" clId="{8AA51869-D50E-4754-B7C3-5AFB8DF1412D}" dt="2025-02-12T14:43:05.621" v="278" actId="164"/>
+          <ac:spMkLst>
+            <pc:docMk/>
+            <pc:sldMk cId="2713533969" sldId="267"/>
+            <ac:spMk id="13" creationId="{F1910AF3-C183-239F-0C1F-9A386AA9DD68}"/>
+          </ac:spMkLst>
+        </pc:spChg>
+        <pc:spChg chg="add mod">
+          <ac:chgData name="Daniel Patterson" userId="48df8f255f7bda56" providerId="LiveId" clId="{8AA51869-D50E-4754-B7C3-5AFB8DF1412D}" dt="2025-02-12T14:43:05.621" v="278" actId="164"/>
+          <ac:spMkLst>
+            <pc:docMk/>
+            <pc:sldMk cId="2713533969" sldId="267"/>
+            <ac:spMk id="14" creationId="{BC286A45-5795-FDDC-84BF-6551269792C1}"/>
+          </ac:spMkLst>
+        </pc:spChg>
+        <pc:spChg chg="add mod">
+          <ac:chgData name="Daniel Patterson" userId="48df8f255f7bda56" providerId="LiveId" clId="{8AA51869-D50E-4754-B7C3-5AFB8DF1412D}" dt="2025-02-12T14:43:05.621" v="278" actId="164"/>
+          <ac:spMkLst>
+            <pc:docMk/>
+            <pc:sldMk cId="2713533969" sldId="267"/>
+            <ac:spMk id="15" creationId="{0AFBD823-5E28-69D1-1F2F-62FAADE75B22}"/>
+          </ac:spMkLst>
+        </pc:spChg>
+        <pc:spChg chg="add mod">
+          <ac:chgData name="Daniel Patterson" userId="48df8f255f7bda56" providerId="LiveId" clId="{8AA51869-D50E-4754-B7C3-5AFB8DF1412D}" dt="2025-02-12T14:43:05.621" v="278" actId="164"/>
+          <ac:spMkLst>
+            <pc:docMk/>
+            <pc:sldMk cId="2713533969" sldId="267"/>
+            <ac:spMk id="16" creationId="{E568100A-1D3E-D561-B608-7E9C2CDC5B90}"/>
+          </ac:spMkLst>
+        </pc:spChg>
+        <pc:spChg chg="add mod">
+          <ac:chgData name="Daniel Patterson" userId="48df8f255f7bda56" providerId="LiveId" clId="{8AA51869-D50E-4754-B7C3-5AFB8DF1412D}" dt="2025-02-12T14:43:05.621" v="278" actId="164"/>
+          <ac:spMkLst>
+            <pc:docMk/>
+            <pc:sldMk cId="2713533969" sldId="267"/>
+            <ac:spMk id="17" creationId="{9EB31BC3-3B39-C156-9623-D3F9130334F8}"/>
+          </ac:spMkLst>
+        </pc:spChg>
+        <pc:spChg chg="add mod">
+          <ac:chgData name="Daniel Patterson" userId="48df8f255f7bda56" providerId="LiveId" clId="{8AA51869-D50E-4754-B7C3-5AFB8DF1412D}" dt="2025-02-12T14:42:29.212" v="277" actId="1076"/>
+          <ac:spMkLst>
+            <pc:docMk/>
+            <pc:sldMk cId="2713533969" sldId="267"/>
+            <ac:spMk id="18" creationId="{F983D014-F21A-0EAC-6E1D-A113B7D8A39E}"/>
+          </ac:spMkLst>
+        </pc:spChg>
+        <pc:grpChg chg="add mod">
+          <ac:chgData name="Daniel Patterson" userId="48df8f255f7bda56" providerId="LiveId" clId="{8AA51869-D50E-4754-B7C3-5AFB8DF1412D}" dt="2025-02-12T14:44:51.013" v="283" actId="1076"/>
+          <ac:grpSpMkLst>
+            <pc:docMk/>
+            <pc:sldMk cId="2713533969" sldId="267"/>
+            <ac:grpSpMk id="20" creationId="{C6E8FB89-2F4B-D9CB-B46B-71C2C9D16C4A}"/>
+          </ac:grpSpMkLst>
+        </pc:grpChg>
+      </pc:sldChg>
+    </pc:docChg>
+  </pc:docChgLst>
   <pc:docChgLst>
     <pc:chgData name="Daniel Patterson" userId="48df8f255f7bda56" providerId="LiveId" clId="{95C81F28-B0C4-4470-9E1B-0F770489298E}"/>
     <pc:docChg chg="undo custSel addSld delSld modSld sldOrd">
@@ -678,14 +839,6 @@
             <ac:spMk id="19" creationId="{DDB5F464-8F63-5F70-3966-D015420D2A06}"/>
           </ac:spMkLst>
         </pc:spChg>
-        <pc:spChg chg="add del mod">
-          <ac:chgData name="Daniel Patterson" userId="48df8f255f7bda56" providerId="LiveId" clId="{95C81F28-B0C4-4470-9E1B-0F770489298E}" dt="2025-01-27T22:51:48.639" v="1112" actId="478"/>
-          <ac:spMkLst>
-            <pc:docMk/>
-            <pc:sldMk cId="2548042813" sldId="258"/>
-            <ac:spMk id="20" creationId="{93B77EDB-96C0-8F8E-4AD2-CCCAB7D56DDD}"/>
-          </ac:spMkLst>
-        </pc:spChg>
         <pc:spChg chg="add mod">
           <ac:chgData name="Daniel Patterson" userId="48df8f255f7bda56" providerId="LiveId" clId="{95C81F28-B0C4-4470-9E1B-0F770489298E}" dt="2025-01-27T22:54:01.779" v="1161" actId="20577"/>
           <ac:spMkLst>
@@ -1279,7 +1432,7 @@
           <a:p>
             <a:fld id="{3B0B9679-443A-4C20-8F8C-A3D398E717DE}" type="datetimeFigureOut">
               <a:rPr lang="en-US" smtClean="0"/>
-              <a:t>01/28/2025</a:t>
+              <a:t>02/12/2025</a:t>
             </a:fld>
             <a:endParaRPr lang="en-US"/>
           </a:p>
@@ -1477,7 +1630,7 @@
           <a:p>
             <a:fld id="{3B0B9679-443A-4C20-8F8C-A3D398E717DE}" type="datetimeFigureOut">
               <a:rPr lang="en-US" smtClean="0"/>
-              <a:t>01/28/2025</a:t>
+              <a:t>02/12/2025</a:t>
             </a:fld>
             <a:endParaRPr lang="en-US"/>
           </a:p>
@@ -1685,7 +1838,7 @@
           <a:p>
             <a:fld id="{3B0B9679-443A-4C20-8F8C-A3D398E717DE}" type="datetimeFigureOut">
               <a:rPr lang="en-US" smtClean="0"/>
-              <a:t>01/28/2025</a:t>
+              <a:t>02/12/2025</a:t>
             </a:fld>
             <a:endParaRPr lang="en-US"/>
           </a:p>
@@ -1883,7 +2036,7 @@
           <a:p>
             <a:fld id="{3B0B9679-443A-4C20-8F8C-A3D398E717DE}" type="datetimeFigureOut">
               <a:rPr lang="en-US" smtClean="0"/>
-              <a:t>01/28/2025</a:t>
+              <a:t>02/12/2025</a:t>
             </a:fld>
             <a:endParaRPr lang="en-US"/>
           </a:p>
@@ -2158,7 +2311,7 @@
           <a:p>
             <a:fld id="{3B0B9679-443A-4C20-8F8C-A3D398E717DE}" type="datetimeFigureOut">
               <a:rPr lang="en-US" smtClean="0"/>
-              <a:t>01/28/2025</a:t>
+              <a:t>02/12/2025</a:t>
             </a:fld>
             <a:endParaRPr lang="en-US"/>
           </a:p>
@@ -2423,7 +2576,7 @@
           <a:p>
             <a:fld id="{3B0B9679-443A-4C20-8F8C-A3D398E717DE}" type="datetimeFigureOut">
               <a:rPr lang="en-US" smtClean="0"/>
-              <a:t>01/28/2025</a:t>
+              <a:t>02/12/2025</a:t>
             </a:fld>
             <a:endParaRPr lang="en-US"/>
           </a:p>
@@ -2835,7 +2988,7 @@
           <a:p>
             <a:fld id="{3B0B9679-443A-4C20-8F8C-A3D398E717DE}" type="datetimeFigureOut">
               <a:rPr lang="en-US" smtClean="0"/>
-              <a:t>01/28/2025</a:t>
+              <a:t>02/12/2025</a:t>
             </a:fld>
             <a:endParaRPr lang="en-US"/>
           </a:p>
@@ -2976,7 +3129,7 @@
           <a:p>
             <a:fld id="{3B0B9679-443A-4C20-8F8C-A3D398E717DE}" type="datetimeFigureOut">
               <a:rPr lang="en-US" smtClean="0"/>
-              <a:t>01/28/2025</a:t>
+              <a:t>02/12/2025</a:t>
             </a:fld>
             <a:endParaRPr lang="en-US"/>
           </a:p>
@@ -3089,7 +3242,7 @@
           <a:p>
             <a:fld id="{3B0B9679-443A-4C20-8F8C-A3D398E717DE}" type="datetimeFigureOut">
               <a:rPr lang="en-US" smtClean="0"/>
-              <a:t>01/28/2025</a:t>
+              <a:t>02/12/2025</a:t>
             </a:fld>
             <a:endParaRPr lang="en-US"/>
           </a:p>
@@ -3400,7 +3553,7 @@
           <a:p>
             <a:fld id="{3B0B9679-443A-4C20-8F8C-A3D398E717DE}" type="datetimeFigureOut">
               <a:rPr lang="en-US" smtClean="0"/>
-              <a:t>01/28/2025</a:t>
+              <a:t>02/12/2025</a:t>
             </a:fld>
             <a:endParaRPr lang="en-US"/>
           </a:p>
@@ -3688,7 +3841,7 @@
           <a:p>
             <a:fld id="{3B0B9679-443A-4C20-8F8C-A3D398E717DE}" type="datetimeFigureOut">
               <a:rPr lang="en-US" smtClean="0"/>
-              <a:t>01/28/2025</a:t>
+              <a:t>02/12/2025</a:t>
             </a:fld>
             <a:endParaRPr lang="en-US"/>
           </a:p>
@@ -3929,7 +4082,7 @@
           <a:p>
             <a:fld id="{3B0B9679-443A-4C20-8F8C-A3D398E717DE}" type="datetimeFigureOut">
               <a:rPr lang="en-US" smtClean="0"/>
-              <a:t>01/28/2025</a:t>
+              <a:t>02/12/2025</a:t>
             </a:fld>
             <a:endParaRPr lang="en-US"/>
           </a:p>
@@ -6661,6 +6814,1155 @@
     <p:extLst>
       <p:ext uri="{BB962C8B-B14F-4D97-AF65-F5344CB8AC3E}">
         <p14:creationId xmlns:p14="http://schemas.microsoft.com/office/powerpoint/2010/main" val="3766591705"/>
+      </p:ext>
+    </p:extLst>
+  </p:cSld>
+  <p:clrMapOvr>
+    <a:masterClrMapping/>
+  </p:clrMapOvr>
+</p:sld>
+</file>
+
+<file path=ppt/slides/slide12.xml><?xml version="1.0" encoding="utf-8"?>
+<p:sld xmlns:a="http://schemas.openxmlformats.org/drawingml/2006/main" xmlns:r="http://schemas.openxmlformats.org/officeDocument/2006/relationships" xmlns:p="http://schemas.openxmlformats.org/presentationml/2006/main">
+  <p:cSld>
+    <p:spTree>
+      <p:nvGrpSpPr>
+        <p:cNvPr id="1" name=""/>
+        <p:cNvGrpSpPr/>
+        <p:nvPr/>
+      </p:nvGrpSpPr>
+      <p:grpSpPr>
+        <a:xfrm>
+          <a:off x="0" y="0"/>
+          <a:ext cx="0" cy="0"/>
+          <a:chOff x="0" y="0"/>
+          <a:chExt cx="0" cy="0"/>
+        </a:xfrm>
+      </p:grpSpPr>
+      <p:grpSp>
+        <p:nvGrpSpPr>
+          <p:cNvPr id="20" name="Group 19">
+            <a:extLst>
+              <a:ext uri="{FF2B5EF4-FFF2-40B4-BE49-F238E27FC236}">
+                <a16:creationId xmlns:a16="http://schemas.microsoft.com/office/drawing/2014/main" id="{C6E8FB89-2F4B-D9CB-B46B-71C2C9D16C4A}"/>
+              </a:ext>
+            </a:extLst>
+          </p:cNvPr>
+          <p:cNvGrpSpPr/>
+          <p:nvPr/>
+        </p:nvGrpSpPr>
+        <p:grpSpPr>
+          <a:xfrm>
+            <a:off x="1634939" y="497858"/>
+            <a:ext cx="3188522" cy="1132825"/>
+            <a:chOff x="1695899" y="511437"/>
+            <a:chExt cx="3188522" cy="1132825"/>
+          </a:xfrm>
+        </p:grpSpPr>
+        <p:sp>
+          <p:nvSpPr>
+            <p:cNvPr id="2" name="Rectangle 1">
+              <a:extLst>
+                <a:ext uri="{FF2B5EF4-FFF2-40B4-BE49-F238E27FC236}">
+                  <a16:creationId xmlns:a16="http://schemas.microsoft.com/office/drawing/2014/main" id="{9B4B47E0-9148-7DA4-36F0-AA5E10C229C8}"/>
+                </a:ext>
+              </a:extLst>
+            </p:cNvPr>
+            <p:cNvSpPr/>
+            <p:nvPr/>
+          </p:nvSpPr>
+          <p:spPr>
+            <a:xfrm>
+              <a:off x="1695899" y="511437"/>
+              <a:ext cx="2723702" cy="254374"/>
+            </a:xfrm>
+            <a:prstGeom prst="rect">
+              <a:avLst/>
+            </a:prstGeom>
+            <a:solidFill>
+              <a:srgbClr val="FFFFF1"/>
+            </a:solidFill>
+            <a:ln w="12700"/>
+          </p:spPr>
+          <p:style>
+            <a:lnRef idx="2">
+              <a:schemeClr val="accent1">
+                <a:shade val="15000"/>
+              </a:schemeClr>
+            </a:lnRef>
+            <a:fillRef idx="1">
+              <a:schemeClr val="accent1"/>
+            </a:fillRef>
+            <a:effectRef idx="0">
+              <a:schemeClr val="accent1"/>
+            </a:effectRef>
+            <a:fontRef idx="minor">
+              <a:schemeClr val="lt1"/>
+            </a:fontRef>
+          </p:style>
+          <p:txBody>
+            <a:bodyPr rtlCol="0" anchor="ctr"/>
+            <a:lstStyle/>
+            <a:p>
+              <a:r>
+                <a:rPr lang="en-US" sz="1200" dirty="0" err="1">
+                  <a:solidFill>
+                    <a:schemeClr val="tx1"/>
+                  </a:solidFill>
+                </a:rPr>
+                <a:t>CutProfileCollection</a:t>
+              </a:r>
+              <a:endParaRPr lang="en-US" sz="1200" dirty="0">
+                <a:solidFill>
+                  <a:schemeClr val="tx1"/>
+                </a:solidFill>
+              </a:endParaRPr>
+            </a:p>
+          </p:txBody>
+        </p:sp>
+        <p:sp>
+          <p:nvSpPr>
+            <p:cNvPr id="3" name="Rectangle 2">
+              <a:extLst>
+                <a:ext uri="{FF2B5EF4-FFF2-40B4-BE49-F238E27FC236}">
+                  <a16:creationId xmlns:a16="http://schemas.microsoft.com/office/drawing/2014/main" id="{727EACA3-D695-538C-EFB5-EF7032060665}"/>
+                </a:ext>
+              </a:extLst>
+            </p:cNvPr>
+            <p:cNvSpPr/>
+            <p:nvPr/>
+          </p:nvSpPr>
+          <p:spPr>
+            <a:xfrm>
+              <a:off x="1929384" y="804672"/>
+              <a:ext cx="2723702" cy="254374"/>
+            </a:xfrm>
+            <a:prstGeom prst="rect">
+              <a:avLst/>
+            </a:prstGeom>
+            <a:solidFill>
+              <a:srgbClr val="F2AA84"/>
+            </a:solidFill>
+            <a:ln w="12700"/>
+          </p:spPr>
+          <p:style>
+            <a:lnRef idx="2">
+              <a:schemeClr val="accent1">
+                <a:shade val="15000"/>
+              </a:schemeClr>
+            </a:lnRef>
+            <a:fillRef idx="1">
+              <a:schemeClr val="accent1"/>
+            </a:fillRef>
+            <a:effectRef idx="0">
+              <a:schemeClr val="accent1"/>
+            </a:effectRef>
+            <a:fontRef idx="minor">
+              <a:schemeClr val="lt1"/>
+            </a:fontRef>
+          </p:style>
+          <p:txBody>
+            <a:bodyPr rtlCol="0" anchor="ctr"/>
+            <a:lstStyle/>
+            <a:p>
+              <a:r>
+                <a:rPr lang="en-US" sz="1200" dirty="0" err="1">
+                  <a:solidFill>
+                    <a:schemeClr val="tx1"/>
+                  </a:solidFill>
+                </a:rPr>
+                <a:t>CutProfileItem</a:t>
+              </a:r>
+              <a:r>
+                <a:rPr lang="en-US" sz="1200" dirty="0">
+                  <a:solidFill>
+                    <a:schemeClr val="tx1"/>
+                  </a:solidFill>
+                </a:rPr>
+                <a:t> : </a:t>
+              </a:r>
+              <a:r>
+                <a:rPr lang="en-US" sz="1200" dirty="0" err="1">
+                  <a:solidFill>
+                    <a:schemeClr val="tx1"/>
+                  </a:solidFill>
+                </a:rPr>
+                <a:t>PatternTemplateItem</a:t>
+              </a:r>
+              <a:endParaRPr lang="en-US" sz="1200" dirty="0">
+                <a:solidFill>
+                  <a:schemeClr val="tx1"/>
+                </a:solidFill>
+              </a:endParaRPr>
+            </a:p>
+          </p:txBody>
+        </p:sp>
+        <p:sp>
+          <p:nvSpPr>
+            <p:cNvPr id="4" name="Rectangle 3">
+              <a:extLst>
+                <a:ext uri="{FF2B5EF4-FFF2-40B4-BE49-F238E27FC236}">
+                  <a16:creationId xmlns:a16="http://schemas.microsoft.com/office/drawing/2014/main" id="{A4D9662F-E93B-F6B5-B100-CDF66E428854}"/>
+                </a:ext>
+              </a:extLst>
+            </p:cNvPr>
+            <p:cNvSpPr/>
+            <p:nvPr/>
+          </p:nvSpPr>
+          <p:spPr>
+            <a:xfrm>
+              <a:off x="2160719" y="1098178"/>
+              <a:ext cx="2723702" cy="254374"/>
+            </a:xfrm>
+            <a:prstGeom prst="rect">
+              <a:avLst/>
+            </a:prstGeom>
+            <a:solidFill>
+              <a:schemeClr val="tx2">
+                <a:lumMod val="10000"/>
+                <a:lumOff val="90000"/>
+              </a:schemeClr>
+            </a:solidFill>
+            <a:ln w="12700"/>
+          </p:spPr>
+          <p:style>
+            <a:lnRef idx="2">
+              <a:schemeClr val="accent1">
+                <a:shade val="15000"/>
+              </a:schemeClr>
+            </a:lnRef>
+            <a:fillRef idx="1">
+              <a:schemeClr val="accent1"/>
+            </a:fillRef>
+            <a:effectRef idx="0">
+              <a:schemeClr val="accent1"/>
+            </a:effectRef>
+            <a:fontRef idx="minor">
+              <a:schemeClr val="lt1"/>
+            </a:fontRef>
+          </p:style>
+          <p:txBody>
+            <a:bodyPr rtlCol="0" anchor="ctr"/>
+            <a:lstStyle/>
+            <a:p>
+              <a:r>
+                <a:rPr lang="en-US" sz="1200" dirty="0" err="1">
+                  <a:solidFill>
+                    <a:schemeClr val="tx1"/>
+                  </a:solidFill>
+                </a:rPr>
+                <a:t>EndLocation</a:t>
+              </a:r>
+              <a:endParaRPr lang="en-US" sz="1200" dirty="0">
+                <a:solidFill>
+                  <a:schemeClr val="tx1"/>
+                </a:solidFill>
+              </a:endParaRPr>
+            </a:p>
+          </p:txBody>
+        </p:sp>
+        <p:sp>
+          <p:nvSpPr>
+            <p:cNvPr id="5" name="Rectangle 4">
+              <a:extLst>
+                <a:ext uri="{FF2B5EF4-FFF2-40B4-BE49-F238E27FC236}">
+                  <a16:creationId xmlns:a16="http://schemas.microsoft.com/office/drawing/2014/main" id="{6A671550-22B8-CB3E-F308-325592412EB4}"/>
+                </a:ext>
+              </a:extLst>
+            </p:cNvPr>
+            <p:cNvSpPr/>
+            <p:nvPr/>
+          </p:nvSpPr>
+          <p:spPr>
+            <a:xfrm>
+              <a:off x="2160719" y="1389888"/>
+              <a:ext cx="2723702" cy="254374"/>
+            </a:xfrm>
+            <a:prstGeom prst="rect">
+              <a:avLst/>
+            </a:prstGeom>
+            <a:solidFill>
+              <a:schemeClr val="tx2">
+                <a:lumMod val="10000"/>
+                <a:lumOff val="90000"/>
+              </a:schemeClr>
+            </a:solidFill>
+            <a:ln w="12700"/>
+          </p:spPr>
+          <p:style>
+            <a:lnRef idx="2">
+              <a:schemeClr val="accent1">
+                <a:shade val="15000"/>
+              </a:schemeClr>
+            </a:lnRef>
+            <a:fillRef idx="1">
+              <a:schemeClr val="accent1"/>
+            </a:fillRef>
+            <a:effectRef idx="0">
+              <a:schemeClr val="accent1"/>
+            </a:effectRef>
+            <a:fontRef idx="minor">
+              <a:schemeClr val="lt1"/>
+            </a:fontRef>
+          </p:style>
+          <p:txBody>
+            <a:bodyPr rtlCol="0" anchor="ctr"/>
+            <a:lstStyle/>
+            <a:p>
+              <a:r>
+                <a:rPr lang="en-US" sz="1200" dirty="0" err="1">
+                  <a:solidFill>
+                    <a:schemeClr val="tx1"/>
+                  </a:solidFill>
+                </a:rPr>
+                <a:t>StartLocation</a:t>
+              </a:r>
+              <a:endParaRPr lang="en-US" sz="1200" dirty="0">
+                <a:solidFill>
+                  <a:schemeClr val="tx1"/>
+                </a:solidFill>
+              </a:endParaRPr>
+            </a:p>
+          </p:txBody>
+        </p:sp>
+      </p:grpSp>
+      <p:grpSp>
+        <p:nvGrpSpPr>
+          <p:cNvPr id="19" name="Group 18">
+            <a:extLst>
+              <a:ext uri="{FF2B5EF4-FFF2-40B4-BE49-F238E27FC236}">
+                <a16:creationId xmlns:a16="http://schemas.microsoft.com/office/drawing/2014/main" id="{719FEC40-2C12-1199-4D55-B4F72023C5B6}"/>
+              </a:ext>
+            </a:extLst>
+          </p:cNvPr>
+          <p:cNvGrpSpPr/>
+          <p:nvPr/>
+        </p:nvGrpSpPr>
+        <p:grpSpPr>
+          <a:xfrm>
+            <a:off x="5208719" y="500008"/>
+            <a:ext cx="3184263" cy="3683396"/>
+            <a:chOff x="5208719" y="500008"/>
+            <a:chExt cx="3184263" cy="3683396"/>
+          </a:xfrm>
+        </p:grpSpPr>
+        <p:sp>
+          <p:nvSpPr>
+            <p:cNvPr id="6" name="Rectangle 5">
+              <a:extLst>
+                <a:ext uri="{FF2B5EF4-FFF2-40B4-BE49-F238E27FC236}">
+                  <a16:creationId xmlns:a16="http://schemas.microsoft.com/office/drawing/2014/main" id="{0E172290-6605-2D8F-4E6A-891C1BD30FF2}"/>
+                </a:ext>
+              </a:extLst>
+            </p:cNvPr>
+            <p:cNvSpPr/>
+            <p:nvPr/>
+          </p:nvSpPr>
+          <p:spPr>
+            <a:xfrm>
+              <a:off x="5208719" y="500008"/>
+              <a:ext cx="2723702" cy="254374"/>
+            </a:xfrm>
+            <a:prstGeom prst="rect">
+              <a:avLst/>
+            </a:prstGeom>
+            <a:solidFill>
+              <a:srgbClr val="FFFFF1"/>
+            </a:solidFill>
+            <a:ln w="12700"/>
+          </p:spPr>
+          <p:style>
+            <a:lnRef idx="2">
+              <a:schemeClr val="accent1">
+                <a:shade val="15000"/>
+              </a:schemeClr>
+            </a:lnRef>
+            <a:fillRef idx="1">
+              <a:schemeClr val="accent1"/>
+            </a:fillRef>
+            <a:effectRef idx="0">
+              <a:schemeClr val="accent1"/>
+            </a:effectRef>
+            <a:fontRef idx="minor">
+              <a:schemeClr val="lt1"/>
+            </a:fontRef>
+          </p:style>
+          <p:txBody>
+            <a:bodyPr rtlCol="0" anchor="ctr"/>
+            <a:lstStyle/>
+            <a:p>
+              <a:r>
+                <a:rPr lang="en-US" sz="1200" dirty="0" err="1">
+                  <a:solidFill>
+                    <a:schemeClr val="tx1"/>
+                  </a:solidFill>
+                </a:rPr>
+                <a:t>PatternTemplateCollection</a:t>
+              </a:r>
+              <a:endParaRPr lang="en-US" sz="1200" dirty="0">
+                <a:solidFill>
+                  <a:schemeClr val="tx1"/>
+                </a:solidFill>
+              </a:endParaRPr>
+            </a:p>
+          </p:txBody>
+        </p:sp>
+        <p:sp>
+          <p:nvSpPr>
+            <p:cNvPr id="7" name="Rectangle 6">
+              <a:extLst>
+                <a:ext uri="{FF2B5EF4-FFF2-40B4-BE49-F238E27FC236}">
+                  <a16:creationId xmlns:a16="http://schemas.microsoft.com/office/drawing/2014/main" id="{08794E35-8BC3-AACA-1F5C-AD1C5EF834C6}"/>
+                </a:ext>
+              </a:extLst>
+            </p:cNvPr>
+            <p:cNvSpPr/>
+            <p:nvPr/>
+          </p:nvSpPr>
+          <p:spPr>
+            <a:xfrm>
+              <a:off x="5440680" y="795528"/>
+              <a:ext cx="2723702" cy="254374"/>
+            </a:xfrm>
+            <a:prstGeom prst="rect">
+              <a:avLst/>
+            </a:prstGeom>
+            <a:solidFill>
+              <a:srgbClr val="F2AA84"/>
+            </a:solidFill>
+            <a:ln w="12700"/>
+          </p:spPr>
+          <p:style>
+            <a:lnRef idx="2">
+              <a:schemeClr val="accent1">
+                <a:shade val="15000"/>
+              </a:schemeClr>
+            </a:lnRef>
+            <a:fillRef idx="1">
+              <a:schemeClr val="accent1"/>
+            </a:fillRef>
+            <a:effectRef idx="0">
+              <a:schemeClr val="accent1"/>
+            </a:effectRef>
+            <a:fontRef idx="minor">
+              <a:schemeClr val="lt1"/>
+            </a:fontRef>
+          </p:style>
+          <p:txBody>
+            <a:bodyPr rtlCol="0" anchor="ctr"/>
+            <a:lstStyle/>
+            <a:p>
+              <a:r>
+                <a:rPr lang="en-US" sz="1200" dirty="0" err="1">
+                  <a:solidFill>
+                    <a:schemeClr val="tx1"/>
+                  </a:solidFill>
+                </a:rPr>
+                <a:t>PatternTemplateItem</a:t>
+              </a:r>
+              <a:endParaRPr lang="en-US" sz="1200" dirty="0">
+                <a:solidFill>
+                  <a:schemeClr val="tx1"/>
+                </a:solidFill>
+              </a:endParaRPr>
+            </a:p>
+          </p:txBody>
+        </p:sp>
+        <p:sp>
+          <p:nvSpPr>
+            <p:cNvPr id="8" name="Rectangle 7">
+              <a:extLst>
+                <a:ext uri="{FF2B5EF4-FFF2-40B4-BE49-F238E27FC236}">
+                  <a16:creationId xmlns:a16="http://schemas.microsoft.com/office/drawing/2014/main" id="{06EAA8C9-8862-F7AC-2B28-2BF7F4DBE49E}"/>
+                </a:ext>
+              </a:extLst>
+            </p:cNvPr>
+            <p:cNvSpPr/>
+            <p:nvPr/>
+          </p:nvSpPr>
+          <p:spPr>
+            <a:xfrm>
+              <a:off x="5669280" y="1086749"/>
+              <a:ext cx="2723702" cy="254374"/>
+            </a:xfrm>
+            <a:prstGeom prst="rect">
+              <a:avLst/>
+            </a:prstGeom>
+            <a:solidFill>
+              <a:schemeClr val="tx2">
+                <a:lumMod val="10000"/>
+                <a:lumOff val="90000"/>
+              </a:schemeClr>
+            </a:solidFill>
+            <a:ln w="12700"/>
+          </p:spPr>
+          <p:style>
+            <a:lnRef idx="2">
+              <a:schemeClr val="accent1">
+                <a:shade val="15000"/>
+              </a:schemeClr>
+            </a:lnRef>
+            <a:fillRef idx="1">
+              <a:schemeClr val="accent1"/>
+            </a:fillRef>
+            <a:effectRef idx="0">
+              <a:schemeClr val="accent1"/>
+            </a:effectRef>
+            <a:fontRef idx="minor">
+              <a:schemeClr val="lt1"/>
+            </a:fontRef>
+          </p:style>
+          <p:txBody>
+            <a:bodyPr rtlCol="0" anchor="ctr"/>
+            <a:lstStyle/>
+            <a:p>
+              <a:r>
+                <a:rPr lang="en-US" sz="1200" dirty="0" err="1">
+                  <a:solidFill>
+                    <a:schemeClr val="tx1"/>
+                  </a:solidFill>
+                </a:rPr>
+                <a:t>DisplayFormat</a:t>
+              </a:r>
+              <a:endParaRPr lang="en-US" sz="1200" dirty="0">
+                <a:solidFill>
+                  <a:schemeClr val="tx1"/>
+                </a:solidFill>
+              </a:endParaRPr>
+            </a:p>
+          </p:txBody>
+        </p:sp>
+        <p:sp>
+          <p:nvSpPr>
+            <p:cNvPr id="9" name="Rectangle 8">
+              <a:extLst>
+                <a:ext uri="{FF2B5EF4-FFF2-40B4-BE49-F238E27FC236}">
+                  <a16:creationId xmlns:a16="http://schemas.microsoft.com/office/drawing/2014/main" id="{903336EB-A735-63F2-AB65-01E3828888AC}"/>
+                </a:ext>
+              </a:extLst>
+            </p:cNvPr>
+            <p:cNvSpPr/>
+            <p:nvPr/>
+          </p:nvSpPr>
+          <p:spPr>
+            <a:xfrm>
+              <a:off x="5669280" y="1376309"/>
+              <a:ext cx="2723702" cy="254374"/>
+            </a:xfrm>
+            <a:prstGeom prst="rect">
+              <a:avLst/>
+            </a:prstGeom>
+            <a:solidFill>
+              <a:schemeClr val="tx2">
+                <a:lumMod val="10000"/>
+                <a:lumOff val="90000"/>
+              </a:schemeClr>
+            </a:solidFill>
+            <a:ln w="12700"/>
+          </p:spPr>
+          <p:style>
+            <a:lnRef idx="2">
+              <a:schemeClr val="accent1">
+                <a:shade val="15000"/>
+              </a:schemeClr>
+            </a:lnRef>
+            <a:fillRef idx="1">
+              <a:schemeClr val="accent1"/>
+            </a:fillRef>
+            <a:effectRef idx="0">
+              <a:schemeClr val="accent1"/>
+            </a:effectRef>
+            <a:fontRef idx="minor">
+              <a:schemeClr val="lt1"/>
+            </a:fontRef>
+          </p:style>
+          <p:txBody>
+            <a:bodyPr rtlCol="0" anchor="ctr"/>
+            <a:lstStyle/>
+            <a:p>
+              <a:r>
+                <a:rPr lang="en-US" sz="1200" dirty="0" err="1">
+                  <a:solidFill>
+                    <a:schemeClr val="tx1"/>
+                  </a:solidFill>
+                </a:rPr>
+                <a:t>IconFilename</a:t>
+              </a:r>
+              <a:endParaRPr lang="en-US" sz="1200" dirty="0">
+                <a:solidFill>
+                  <a:schemeClr val="tx1"/>
+                </a:solidFill>
+              </a:endParaRPr>
+            </a:p>
+          </p:txBody>
+        </p:sp>
+        <p:sp>
+          <p:nvSpPr>
+            <p:cNvPr id="10" name="Rectangle 9">
+              <a:extLst>
+                <a:ext uri="{FF2B5EF4-FFF2-40B4-BE49-F238E27FC236}">
+                  <a16:creationId xmlns:a16="http://schemas.microsoft.com/office/drawing/2014/main" id="{867A4BA6-94D6-900D-9C76-5946519BFB1A}"/>
+                </a:ext>
+              </a:extLst>
+            </p:cNvPr>
+            <p:cNvSpPr/>
+            <p:nvPr/>
+          </p:nvSpPr>
+          <p:spPr>
+            <a:xfrm>
+              <a:off x="5669280" y="1665869"/>
+              <a:ext cx="2723702" cy="254374"/>
+            </a:xfrm>
+            <a:prstGeom prst="rect">
+              <a:avLst/>
+            </a:prstGeom>
+            <a:solidFill>
+              <a:schemeClr val="tx2">
+                <a:lumMod val="10000"/>
+                <a:lumOff val="90000"/>
+              </a:schemeClr>
+            </a:solidFill>
+            <a:ln w="12700"/>
+          </p:spPr>
+          <p:style>
+            <a:lnRef idx="2">
+              <a:schemeClr val="accent1">
+                <a:shade val="15000"/>
+              </a:schemeClr>
+            </a:lnRef>
+            <a:fillRef idx="1">
+              <a:schemeClr val="accent1"/>
+            </a:fillRef>
+            <a:effectRef idx="0">
+              <a:schemeClr val="accent1"/>
+            </a:effectRef>
+            <a:fontRef idx="minor">
+              <a:schemeClr val="lt1"/>
+            </a:fontRef>
+          </p:style>
+          <p:txBody>
+            <a:bodyPr rtlCol="0" anchor="ctr"/>
+            <a:lstStyle/>
+            <a:p>
+              <a:r>
+                <a:rPr lang="en-US" sz="1200" dirty="0">
+                  <a:solidFill>
+                    <a:schemeClr val="tx1"/>
+                  </a:solidFill>
+                </a:rPr>
+                <a:t>Operations</a:t>
+              </a:r>
+            </a:p>
+          </p:txBody>
+        </p:sp>
+        <p:sp>
+          <p:nvSpPr>
+            <p:cNvPr id="11" name="Rectangle 10">
+              <a:extLst>
+                <a:ext uri="{FF2B5EF4-FFF2-40B4-BE49-F238E27FC236}">
+                  <a16:creationId xmlns:a16="http://schemas.microsoft.com/office/drawing/2014/main" id="{286C04CB-C408-9033-23FC-C7E7D01FAC38}"/>
+                </a:ext>
+              </a:extLst>
+            </p:cNvPr>
+            <p:cNvSpPr/>
+            <p:nvPr/>
+          </p:nvSpPr>
+          <p:spPr>
+            <a:xfrm>
+              <a:off x="5669280" y="1955429"/>
+              <a:ext cx="2723702" cy="254374"/>
+            </a:xfrm>
+            <a:prstGeom prst="rect">
+              <a:avLst/>
+            </a:prstGeom>
+            <a:solidFill>
+              <a:schemeClr val="tx2">
+                <a:lumMod val="10000"/>
+                <a:lumOff val="90000"/>
+              </a:schemeClr>
+            </a:solidFill>
+            <a:ln w="12700"/>
+          </p:spPr>
+          <p:style>
+            <a:lnRef idx="2">
+              <a:schemeClr val="accent1">
+                <a:shade val="15000"/>
+              </a:schemeClr>
+            </a:lnRef>
+            <a:fillRef idx="1">
+              <a:schemeClr val="accent1"/>
+            </a:fillRef>
+            <a:effectRef idx="0">
+              <a:schemeClr val="accent1"/>
+            </a:effectRef>
+            <a:fontRef idx="minor">
+              <a:schemeClr val="lt1"/>
+            </a:fontRef>
+          </p:style>
+          <p:txBody>
+            <a:bodyPr rtlCol="0" anchor="ctr"/>
+            <a:lstStyle/>
+            <a:p>
+              <a:r>
+                <a:rPr lang="en-US" sz="1200" dirty="0">
+                  <a:solidFill>
+                    <a:schemeClr val="tx1"/>
+                  </a:solidFill>
+                </a:rPr>
+                <a:t>Orientation</a:t>
+              </a:r>
+            </a:p>
+          </p:txBody>
+        </p:sp>
+        <p:sp>
+          <p:nvSpPr>
+            <p:cNvPr id="12" name="Rectangle 11">
+              <a:extLst>
+                <a:ext uri="{FF2B5EF4-FFF2-40B4-BE49-F238E27FC236}">
+                  <a16:creationId xmlns:a16="http://schemas.microsoft.com/office/drawing/2014/main" id="{07498AB8-4652-2648-9249-61075A0489EE}"/>
+                </a:ext>
+              </a:extLst>
+            </p:cNvPr>
+            <p:cNvSpPr/>
+            <p:nvPr/>
+          </p:nvSpPr>
+          <p:spPr>
+            <a:xfrm>
+              <a:off x="5669280" y="2237372"/>
+              <a:ext cx="2723702" cy="254374"/>
+            </a:xfrm>
+            <a:prstGeom prst="rect">
+              <a:avLst/>
+            </a:prstGeom>
+            <a:solidFill>
+              <a:schemeClr val="tx2">
+                <a:lumMod val="10000"/>
+                <a:lumOff val="90000"/>
+              </a:schemeClr>
+            </a:solidFill>
+            <a:ln w="12700"/>
+          </p:spPr>
+          <p:style>
+            <a:lnRef idx="2">
+              <a:schemeClr val="accent1">
+                <a:shade val="15000"/>
+              </a:schemeClr>
+            </a:lnRef>
+            <a:fillRef idx="1">
+              <a:schemeClr val="accent1"/>
+            </a:fillRef>
+            <a:effectRef idx="0">
+              <a:schemeClr val="accent1"/>
+            </a:effectRef>
+            <a:fontRef idx="minor">
+              <a:schemeClr val="lt1"/>
+            </a:fontRef>
+          </p:style>
+          <p:txBody>
+            <a:bodyPr rtlCol="0" anchor="ctr"/>
+            <a:lstStyle/>
+            <a:p>
+              <a:r>
+                <a:rPr lang="en-US" sz="1200" dirty="0" err="1">
+                  <a:solidFill>
+                    <a:schemeClr val="tx1"/>
+                  </a:solidFill>
+                </a:rPr>
+                <a:t>PatternLength</a:t>
+              </a:r>
+              <a:endParaRPr lang="en-US" sz="1200" dirty="0">
+                <a:solidFill>
+                  <a:schemeClr val="tx1"/>
+                </a:solidFill>
+              </a:endParaRPr>
+            </a:p>
+          </p:txBody>
+        </p:sp>
+        <p:sp>
+          <p:nvSpPr>
+            <p:cNvPr id="13" name="Rectangle 12">
+              <a:extLst>
+                <a:ext uri="{FF2B5EF4-FFF2-40B4-BE49-F238E27FC236}">
+                  <a16:creationId xmlns:a16="http://schemas.microsoft.com/office/drawing/2014/main" id="{F1910AF3-C183-239F-0C1F-9A386AA9DD68}"/>
+                </a:ext>
+              </a:extLst>
+            </p:cNvPr>
+            <p:cNvSpPr/>
+            <p:nvPr/>
+          </p:nvSpPr>
+          <p:spPr>
+            <a:xfrm>
+              <a:off x="5669280" y="2519315"/>
+              <a:ext cx="2723702" cy="254374"/>
+            </a:xfrm>
+            <a:prstGeom prst="rect">
+              <a:avLst/>
+            </a:prstGeom>
+            <a:solidFill>
+              <a:schemeClr val="tx2">
+                <a:lumMod val="10000"/>
+                <a:lumOff val="90000"/>
+              </a:schemeClr>
+            </a:solidFill>
+            <a:ln w="12700"/>
+          </p:spPr>
+          <p:style>
+            <a:lnRef idx="2">
+              <a:schemeClr val="accent1">
+                <a:shade val="15000"/>
+              </a:schemeClr>
+            </a:lnRef>
+            <a:fillRef idx="1">
+              <a:schemeClr val="accent1"/>
+            </a:fillRef>
+            <a:effectRef idx="0">
+              <a:schemeClr val="accent1"/>
+            </a:effectRef>
+            <a:fontRef idx="minor">
+              <a:schemeClr val="lt1"/>
+            </a:fontRef>
+          </p:style>
+          <p:txBody>
+            <a:bodyPr rtlCol="0" anchor="ctr"/>
+            <a:lstStyle/>
+            <a:p>
+              <a:r>
+                <a:rPr lang="en-US" sz="1200" dirty="0" err="1">
+                  <a:solidFill>
+                    <a:schemeClr val="tx1"/>
+                  </a:solidFill>
+                </a:rPr>
+                <a:t>PatternTemplateId</a:t>
+              </a:r>
+              <a:endParaRPr lang="en-US" sz="1200" dirty="0">
+                <a:solidFill>
+                  <a:schemeClr val="tx1"/>
+                </a:solidFill>
+              </a:endParaRPr>
+            </a:p>
+          </p:txBody>
+        </p:sp>
+        <p:sp>
+          <p:nvSpPr>
+            <p:cNvPr id="14" name="Rectangle 13">
+              <a:extLst>
+                <a:ext uri="{FF2B5EF4-FFF2-40B4-BE49-F238E27FC236}">
+                  <a16:creationId xmlns:a16="http://schemas.microsoft.com/office/drawing/2014/main" id="{BC286A45-5795-FDDC-84BF-6551269792C1}"/>
+                </a:ext>
+              </a:extLst>
+            </p:cNvPr>
+            <p:cNvSpPr/>
+            <p:nvPr/>
+          </p:nvSpPr>
+          <p:spPr>
+            <a:xfrm>
+              <a:off x="5669280" y="2801258"/>
+              <a:ext cx="2723702" cy="254374"/>
+            </a:xfrm>
+            <a:prstGeom prst="rect">
+              <a:avLst/>
+            </a:prstGeom>
+            <a:solidFill>
+              <a:schemeClr val="tx2">
+                <a:lumMod val="10000"/>
+                <a:lumOff val="90000"/>
+              </a:schemeClr>
+            </a:solidFill>
+            <a:ln w="12700"/>
+          </p:spPr>
+          <p:style>
+            <a:lnRef idx="2">
+              <a:schemeClr val="accent1">
+                <a:shade val="15000"/>
+              </a:schemeClr>
+            </a:lnRef>
+            <a:fillRef idx="1">
+              <a:schemeClr val="accent1"/>
+            </a:fillRef>
+            <a:effectRef idx="0">
+              <a:schemeClr val="accent1"/>
+            </a:effectRef>
+            <a:fontRef idx="minor">
+              <a:schemeClr val="lt1"/>
+            </a:fontRef>
+          </p:style>
+          <p:txBody>
+            <a:bodyPr rtlCol="0" anchor="ctr"/>
+            <a:lstStyle/>
+            <a:p>
+              <a:r>
+                <a:rPr lang="en-US" sz="1200" dirty="0" err="1">
+                  <a:solidFill>
+                    <a:schemeClr val="tx1"/>
+                  </a:solidFill>
+                </a:rPr>
+                <a:t>PatternWidth</a:t>
+              </a:r>
+              <a:endParaRPr lang="en-US" sz="1200" dirty="0">
+                <a:solidFill>
+                  <a:schemeClr val="tx1"/>
+                </a:solidFill>
+              </a:endParaRPr>
+            </a:p>
+          </p:txBody>
+        </p:sp>
+        <p:sp>
+          <p:nvSpPr>
+            <p:cNvPr id="15" name="Rectangle 14">
+              <a:extLst>
+                <a:ext uri="{FF2B5EF4-FFF2-40B4-BE49-F238E27FC236}">
+                  <a16:creationId xmlns:a16="http://schemas.microsoft.com/office/drawing/2014/main" id="{0AFBD823-5E28-69D1-1F2F-62FAADE75B22}"/>
+                </a:ext>
+              </a:extLst>
+            </p:cNvPr>
+            <p:cNvSpPr/>
+            <p:nvPr/>
+          </p:nvSpPr>
+          <p:spPr>
+            <a:xfrm>
+              <a:off x="5669280" y="3083201"/>
+              <a:ext cx="2723702" cy="254374"/>
+            </a:xfrm>
+            <a:prstGeom prst="rect">
+              <a:avLst/>
+            </a:prstGeom>
+            <a:solidFill>
+              <a:schemeClr val="tx2">
+                <a:lumMod val="10000"/>
+                <a:lumOff val="90000"/>
+              </a:schemeClr>
+            </a:solidFill>
+            <a:ln w="12700"/>
+          </p:spPr>
+          <p:style>
+            <a:lnRef idx="2">
+              <a:schemeClr val="accent1">
+                <a:shade val="15000"/>
+              </a:schemeClr>
+            </a:lnRef>
+            <a:fillRef idx="1">
+              <a:schemeClr val="accent1"/>
+            </a:fillRef>
+            <a:effectRef idx="0">
+              <a:schemeClr val="accent1"/>
+            </a:effectRef>
+            <a:fontRef idx="minor">
+              <a:schemeClr val="lt1"/>
+            </a:fontRef>
+          </p:style>
+          <p:txBody>
+            <a:bodyPr rtlCol="0" anchor="ctr"/>
+            <a:lstStyle/>
+            <a:p>
+              <a:r>
+                <a:rPr lang="en-US" sz="1200" dirty="0">
+                  <a:solidFill>
+                    <a:schemeClr val="tx1"/>
+                  </a:solidFill>
+                </a:rPr>
+                <a:t>Remarks</a:t>
+              </a:r>
+            </a:p>
+          </p:txBody>
+        </p:sp>
+        <p:sp>
+          <p:nvSpPr>
+            <p:cNvPr id="16" name="Rectangle 15">
+              <a:extLst>
+                <a:ext uri="{FF2B5EF4-FFF2-40B4-BE49-F238E27FC236}">
+                  <a16:creationId xmlns:a16="http://schemas.microsoft.com/office/drawing/2014/main" id="{E568100A-1D3E-D561-B608-7E9C2CDC5B90}"/>
+                </a:ext>
+              </a:extLst>
+            </p:cNvPr>
+            <p:cNvSpPr/>
+            <p:nvPr/>
+          </p:nvSpPr>
+          <p:spPr>
+            <a:xfrm>
+              <a:off x="5669280" y="3365144"/>
+              <a:ext cx="2723702" cy="254374"/>
+            </a:xfrm>
+            <a:prstGeom prst="rect">
+              <a:avLst/>
+            </a:prstGeom>
+            <a:solidFill>
+              <a:schemeClr val="tx2">
+                <a:lumMod val="10000"/>
+                <a:lumOff val="90000"/>
+              </a:schemeClr>
+            </a:solidFill>
+            <a:ln w="12700"/>
+          </p:spPr>
+          <p:style>
+            <a:lnRef idx="2">
+              <a:schemeClr val="accent1">
+                <a:shade val="15000"/>
+              </a:schemeClr>
+            </a:lnRef>
+            <a:fillRef idx="1">
+              <a:schemeClr val="accent1"/>
+            </a:fillRef>
+            <a:effectRef idx="0">
+              <a:schemeClr val="accent1"/>
+            </a:effectRef>
+            <a:fontRef idx="minor">
+              <a:schemeClr val="lt1"/>
+            </a:fontRef>
+          </p:style>
+          <p:txBody>
+            <a:bodyPr rtlCol="0" anchor="ctr"/>
+            <a:lstStyle/>
+            <a:p>
+              <a:r>
+                <a:rPr lang="en-US" sz="1200" dirty="0" err="1">
+                  <a:solidFill>
+                    <a:schemeClr val="tx1"/>
+                  </a:solidFill>
+                </a:rPr>
+                <a:t>SharedVariables</a:t>
+              </a:r>
+              <a:endParaRPr lang="en-US" sz="1200" dirty="0">
+                <a:solidFill>
+                  <a:schemeClr val="tx1"/>
+                </a:solidFill>
+              </a:endParaRPr>
+            </a:p>
+          </p:txBody>
+        </p:sp>
+        <p:sp>
+          <p:nvSpPr>
+            <p:cNvPr id="17" name="Rectangle 16">
+              <a:extLst>
+                <a:ext uri="{FF2B5EF4-FFF2-40B4-BE49-F238E27FC236}">
+                  <a16:creationId xmlns:a16="http://schemas.microsoft.com/office/drawing/2014/main" id="{9EB31BC3-3B39-C156-9623-D3F9130334F8}"/>
+                </a:ext>
+              </a:extLst>
+            </p:cNvPr>
+            <p:cNvSpPr/>
+            <p:nvPr/>
+          </p:nvSpPr>
+          <p:spPr>
+            <a:xfrm>
+              <a:off x="5669280" y="3647087"/>
+              <a:ext cx="2723702" cy="254374"/>
+            </a:xfrm>
+            <a:prstGeom prst="rect">
+              <a:avLst/>
+            </a:prstGeom>
+            <a:solidFill>
+              <a:schemeClr val="tx2">
+                <a:lumMod val="10000"/>
+                <a:lumOff val="90000"/>
+              </a:schemeClr>
+            </a:solidFill>
+            <a:ln w="12700"/>
+          </p:spPr>
+          <p:style>
+            <a:lnRef idx="2">
+              <a:schemeClr val="accent1">
+                <a:shade val="15000"/>
+              </a:schemeClr>
+            </a:lnRef>
+            <a:fillRef idx="1">
+              <a:schemeClr val="accent1"/>
+            </a:fillRef>
+            <a:effectRef idx="0">
+              <a:schemeClr val="accent1"/>
+            </a:effectRef>
+            <a:fontRef idx="minor">
+              <a:schemeClr val="lt1"/>
+            </a:fontRef>
+          </p:style>
+          <p:txBody>
+            <a:bodyPr rtlCol="0" anchor="ctr"/>
+            <a:lstStyle/>
+            <a:p>
+              <a:r>
+                <a:rPr lang="en-US" sz="1200" dirty="0" err="1">
+                  <a:solidFill>
+                    <a:schemeClr val="tx1"/>
+                  </a:solidFill>
+                </a:rPr>
+                <a:t>TemplateName</a:t>
+              </a:r>
+              <a:endParaRPr lang="en-US" sz="1200" dirty="0">
+                <a:solidFill>
+                  <a:schemeClr val="tx1"/>
+                </a:solidFill>
+              </a:endParaRPr>
+            </a:p>
+          </p:txBody>
+        </p:sp>
+        <p:sp>
+          <p:nvSpPr>
+            <p:cNvPr id="18" name="Rectangle 17">
+              <a:extLst>
+                <a:ext uri="{FF2B5EF4-FFF2-40B4-BE49-F238E27FC236}">
+                  <a16:creationId xmlns:a16="http://schemas.microsoft.com/office/drawing/2014/main" id="{F983D014-F21A-0EAC-6E1D-A113B7D8A39E}"/>
+                </a:ext>
+              </a:extLst>
+            </p:cNvPr>
+            <p:cNvSpPr/>
+            <p:nvPr/>
+          </p:nvSpPr>
+          <p:spPr>
+            <a:xfrm>
+              <a:off x="5669280" y="3929030"/>
+              <a:ext cx="2723702" cy="254374"/>
+            </a:xfrm>
+            <a:prstGeom prst="rect">
+              <a:avLst/>
+            </a:prstGeom>
+            <a:solidFill>
+              <a:schemeClr val="tx2">
+                <a:lumMod val="10000"/>
+                <a:lumOff val="90000"/>
+              </a:schemeClr>
+            </a:solidFill>
+            <a:ln w="12700"/>
+          </p:spPr>
+          <p:style>
+            <a:lnRef idx="2">
+              <a:schemeClr val="accent1">
+                <a:shade val="15000"/>
+              </a:schemeClr>
+            </a:lnRef>
+            <a:fillRef idx="1">
+              <a:schemeClr val="accent1"/>
+            </a:fillRef>
+            <a:effectRef idx="0">
+              <a:schemeClr val="accent1"/>
+            </a:effectRef>
+            <a:fontRef idx="minor">
+              <a:schemeClr val="lt1"/>
+            </a:fontRef>
+          </p:style>
+          <p:txBody>
+            <a:bodyPr rtlCol="0" anchor="ctr"/>
+            <a:lstStyle/>
+            <a:p>
+              <a:r>
+                <a:rPr lang="en-US" sz="1200" dirty="0" err="1">
+                  <a:solidFill>
+                    <a:schemeClr val="tx1"/>
+                  </a:solidFill>
+                </a:rPr>
+                <a:t>ToolSequenceStrict</a:t>
+              </a:r>
+              <a:endParaRPr lang="en-US" sz="1200" dirty="0">
+                <a:solidFill>
+                  <a:schemeClr val="tx1"/>
+                </a:solidFill>
+              </a:endParaRPr>
+            </a:p>
+          </p:txBody>
+        </p:sp>
+      </p:grpSp>
+    </p:spTree>
+    <p:extLst>
+      <p:ext uri="{BB962C8B-B14F-4D97-AF65-F5344CB8AC3E}">
+        <p14:creationId xmlns:p14="http://schemas.microsoft.com/office/powerpoint/2010/main" val="2713533969"/>
       </p:ext>
     </p:extLst>
   </p:cSld>

</xml_diff>

<commit_message>
Updates for version 25.1219.4900
Drawing support for all remaining shapes.
</commit_message>
<xml_diff>
--- a/Docs/ShopToolsSketches.pptx
+++ b/Docs/ShopToolsSketches.pptx
@@ -17,6 +17,7 @@
     <p:sldId id="265" r:id="rId11"/>
     <p:sldId id="266" r:id="rId12"/>
     <p:sldId id="267" r:id="rId13"/>
+    <p:sldId id="268" r:id="rId14"/>
   </p:sldIdLst>
   <p:sldSz cx="12192000" cy="6858000"/>
   <p:notesSz cx="6858000" cy="9144000"/>
@@ -126,13 +127,109 @@
 <file path=ppt/revisionInfo.xml><?xml version="1.0" encoding="utf-8"?>
 <p1510:revInfo xmlns:a="http://schemas.openxmlformats.org/drawingml/2006/main" xmlns:r="http://schemas.openxmlformats.org/officeDocument/2006/relationships" xmlns:p1510="http://schemas.microsoft.com/office/powerpoint/2015/10/main">
   <p1510:revLst>
-    <p1510:client id="{8AA51869-D50E-4754-B7C3-5AFB8DF1412D}" v="16" dt="2025-02-12T14:44:37.522"/>
+    <p1510:client id="{EBC1FAC7-4DEE-48FF-BA39-68EC7B53259F}" v="9" dt="2025-02-17T13:16:29.547"/>
   </p1510:revLst>
 </p1510:revInfo>
 </file>
 
 <file path=ppt/changesInfos/changesInfo1.xml><?xml version="1.0" encoding="utf-8"?>
 <pc:chgInfo xmlns:a="http://schemas.openxmlformats.org/drawingml/2006/main" xmlns:r="http://schemas.openxmlformats.org/officeDocument/2006/relationships" xmlns:ac="http://schemas.microsoft.com/office/drawing/2013/main/command" xmlns:pc="http://schemas.microsoft.com/office/powerpoint/2013/main/command">
+  <pc:docChgLst>
+    <pc:chgData name="Daniel Patterson" userId="48df8f255f7bda56" providerId="LiveId" clId="{EBC1FAC7-4DEE-48FF-BA39-68EC7B53259F}"/>
+    <pc:docChg chg="custSel addSld modSld">
+      <pc:chgData name="Daniel Patterson" userId="48df8f255f7bda56" providerId="LiveId" clId="{EBC1FAC7-4DEE-48FF-BA39-68EC7B53259F}" dt="2025-02-17T13:22:43.581" v="519" actId="255"/>
+      <pc:docMkLst>
+        <pc:docMk/>
+      </pc:docMkLst>
+      <pc:sldChg chg="addSp modSp new mod">
+        <pc:chgData name="Daniel Patterson" userId="48df8f255f7bda56" providerId="LiveId" clId="{EBC1FAC7-4DEE-48FF-BA39-68EC7B53259F}" dt="2025-02-17T13:22:43.581" v="519" actId="255"/>
+        <pc:sldMkLst>
+          <pc:docMk/>
+          <pc:sldMk cId="845684127" sldId="268"/>
+        </pc:sldMkLst>
+        <pc:spChg chg="add mod">
+          <ac:chgData name="Daniel Patterson" userId="48df8f255f7bda56" providerId="LiveId" clId="{EBC1FAC7-4DEE-48FF-BA39-68EC7B53259F}" dt="2025-02-17T13:19:21.401" v="501" actId="14100"/>
+          <ac:spMkLst>
+            <pc:docMk/>
+            <pc:sldMk cId="845684127" sldId="268"/>
+            <ac:spMk id="2" creationId="{DF319A74-428A-DC3E-565A-F64889F51A1B}"/>
+          </ac:spMkLst>
+        </pc:spChg>
+        <pc:spChg chg="add mod">
+          <ac:chgData name="Daniel Patterson" userId="48df8f255f7bda56" providerId="LiveId" clId="{EBC1FAC7-4DEE-48FF-BA39-68EC7B53259F}" dt="2025-02-17T13:19:24.561" v="502" actId="14100"/>
+          <ac:spMkLst>
+            <pc:docMk/>
+            <pc:sldMk cId="845684127" sldId="268"/>
+            <ac:spMk id="3" creationId="{856500C9-CB3E-4926-62A9-5F8FE11E55DF}"/>
+          </ac:spMkLst>
+        </pc:spChg>
+        <pc:spChg chg="add mod">
+          <ac:chgData name="Daniel Patterson" userId="48df8f255f7bda56" providerId="LiveId" clId="{EBC1FAC7-4DEE-48FF-BA39-68EC7B53259F}" dt="2025-02-17T13:22:11.354" v="512" actId="113"/>
+          <ac:spMkLst>
+            <pc:docMk/>
+            <pc:sldMk cId="845684127" sldId="268"/>
+            <ac:spMk id="4" creationId="{6AB504C9-0E0C-6E09-59C6-98A5E7724595}"/>
+          </ac:spMkLst>
+        </pc:spChg>
+        <pc:spChg chg="add mod">
+          <ac:chgData name="Daniel Patterson" userId="48df8f255f7bda56" providerId="LiveId" clId="{EBC1FAC7-4DEE-48FF-BA39-68EC7B53259F}" dt="2025-02-17T13:22:15.301" v="513" actId="113"/>
+          <ac:spMkLst>
+            <pc:docMk/>
+            <pc:sldMk cId="845684127" sldId="268"/>
+            <ac:spMk id="5" creationId="{79671D44-18A7-7096-0655-0A2B2C58D0AB}"/>
+          </ac:spMkLst>
+        </pc:spChg>
+        <pc:spChg chg="add mod">
+          <ac:chgData name="Daniel Patterson" userId="48df8f255f7bda56" providerId="LiveId" clId="{EBC1FAC7-4DEE-48FF-BA39-68EC7B53259F}" dt="2025-02-17T13:22:19.096" v="514" actId="113"/>
+          <ac:spMkLst>
+            <pc:docMk/>
+            <pc:sldMk cId="845684127" sldId="268"/>
+            <ac:spMk id="6" creationId="{FD6B4D3C-B73B-A82E-077F-319AE8DCDEFB}"/>
+          </ac:spMkLst>
+        </pc:spChg>
+        <pc:spChg chg="add mod">
+          <ac:chgData name="Daniel Patterson" userId="48df8f255f7bda56" providerId="LiveId" clId="{EBC1FAC7-4DEE-48FF-BA39-68EC7B53259F}" dt="2025-02-17T13:22:43.581" v="519" actId="255"/>
+          <ac:spMkLst>
+            <pc:docMk/>
+            <pc:sldMk cId="845684127" sldId="268"/>
+            <ac:spMk id="7" creationId="{46B114B0-1AE5-86AC-C21A-54EBD4A04A79}"/>
+          </ac:spMkLst>
+        </pc:spChg>
+        <pc:spChg chg="add mod">
+          <ac:chgData name="Daniel Patterson" userId="48df8f255f7bda56" providerId="LiveId" clId="{EBC1FAC7-4DEE-48FF-BA39-68EC7B53259F}" dt="2025-02-17T13:22:29.468" v="516" actId="113"/>
+          <ac:spMkLst>
+            <pc:docMk/>
+            <pc:sldMk cId="845684127" sldId="268"/>
+            <ac:spMk id="8" creationId="{32309524-E642-4147-8A99-5CE5913E0640}"/>
+          </ac:spMkLst>
+        </pc:spChg>
+        <pc:spChg chg="add mod">
+          <ac:chgData name="Daniel Patterson" userId="48df8f255f7bda56" providerId="LiveId" clId="{EBC1FAC7-4DEE-48FF-BA39-68EC7B53259F}" dt="2025-02-17T13:22:33.546" v="517" actId="113"/>
+          <ac:spMkLst>
+            <pc:docMk/>
+            <pc:sldMk cId="845684127" sldId="268"/>
+            <ac:spMk id="9" creationId="{E1577018-C84C-737D-4D08-351B3E1E2FAE}"/>
+          </ac:spMkLst>
+        </pc:spChg>
+        <pc:spChg chg="add mod">
+          <ac:chgData name="Daniel Patterson" userId="48df8f255f7bda56" providerId="LiveId" clId="{EBC1FAC7-4DEE-48FF-BA39-68EC7B53259F}" dt="2025-02-17T13:22:37.232" v="518" actId="113"/>
+          <ac:spMkLst>
+            <pc:docMk/>
+            <pc:sldMk cId="845684127" sldId="268"/>
+            <ac:spMk id="10" creationId="{39EDDAE7-0926-89CB-C06B-BFA05EF8E92B}"/>
+          </ac:spMkLst>
+        </pc:spChg>
+        <pc:spChg chg="add mod">
+          <ac:chgData name="Daniel Patterson" userId="48df8f255f7bda56" providerId="LiveId" clId="{EBC1FAC7-4DEE-48FF-BA39-68EC7B53259F}" dt="2025-02-17T13:22:05.068" v="511" actId="113"/>
+          <ac:spMkLst>
+            <pc:docMk/>
+            <pc:sldMk cId="845684127" sldId="268"/>
+            <ac:spMk id="11" creationId="{E0E17102-FB77-9510-5F23-B4D1ABE0B8E9}"/>
+          </ac:spMkLst>
+        </pc:spChg>
+      </pc:sldChg>
+    </pc:docChg>
+  </pc:docChgLst>
   <pc:docChgLst>
     <pc:chgData name="Daniel Patterson" userId="48df8f255f7bda56" providerId="LiveId" clId="{8AA51869-D50E-4754-B7C3-5AFB8DF1412D}"/>
     <pc:docChg chg="undo custSel addSld modSld">
@@ -1432,7 +1529,7 @@
           <a:p>
             <a:fld id="{3B0B9679-443A-4C20-8F8C-A3D398E717DE}" type="datetimeFigureOut">
               <a:rPr lang="en-US" smtClean="0"/>
-              <a:t>02/12/2025</a:t>
+              <a:t>02/17/2025</a:t>
             </a:fld>
             <a:endParaRPr lang="en-US"/>
           </a:p>
@@ -1630,7 +1727,7 @@
           <a:p>
             <a:fld id="{3B0B9679-443A-4C20-8F8C-A3D398E717DE}" type="datetimeFigureOut">
               <a:rPr lang="en-US" smtClean="0"/>
-              <a:t>02/12/2025</a:t>
+              <a:t>02/17/2025</a:t>
             </a:fld>
             <a:endParaRPr lang="en-US"/>
           </a:p>
@@ -1838,7 +1935,7 @@
           <a:p>
             <a:fld id="{3B0B9679-443A-4C20-8F8C-A3D398E717DE}" type="datetimeFigureOut">
               <a:rPr lang="en-US" smtClean="0"/>
-              <a:t>02/12/2025</a:t>
+              <a:t>02/17/2025</a:t>
             </a:fld>
             <a:endParaRPr lang="en-US"/>
           </a:p>
@@ -2036,7 +2133,7 @@
           <a:p>
             <a:fld id="{3B0B9679-443A-4C20-8F8C-A3D398E717DE}" type="datetimeFigureOut">
               <a:rPr lang="en-US" smtClean="0"/>
-              <a:t>02/12/2025</a:t>
+              <a:t>02/17/2025</a:t>
             </a:fld>
             <a:endParaRPr lang="en-US"/>
           </a:p>
@@ -2311,7 +2408,7 @@
           <a:p>
             <a:fld id="{3B0B9679-443A-4C20-8F8C-A3D398E717DE}" type="datetimeFigureOut">
               <a:rPr lang="en-US" smtClean="0"/>
-              <a:t>02/12/2025</a:t>
+              <a:t>02/17/2025</a:t>
             </a:fld>
             <a:endParaRPr lang="en-US"/>
           </a:p>
@@ -2576,7 +2673,7 @@
           <a:p>
             <a:fld id="{3B0B9679-443A-4C20-8F8C-A3D398E717DE}" type="datetimeFigureOut">
               <a:rPr lang="en-US" smtClean="0"/>
-              <a:t>02/12/2025</a:t>
+              <a:t>02/17/2025</a:t>
             </a:fld>
             <a:endParaRPr lang="en-US"/>
           </a:p>
@@ -2988,7 +3085,7 @@
           <a:p>
             <a:fld id="{3B0B9679-443A-4C20-8F8C-A3D398E717DE}" type="datetimeFigureOut">
               <a:rPr lang="en-US" smtClean="0"/>
-              <a:t>02/12/2025</a:t>
+              <a:t>02/17/2025</a:t>
             </a:fld>
             <a:endParaRPr lang="en-US"/>
           </a:p>
@@ -3129,7 +3226,7 @@
           <a:p>
             <a:fld id="{3B0B9679-443A-4C20-8F8C-A3D398E717DE}" type="datetimeFigureOut">
               <a:rPr lang="en-US" smtClean="0"/>
-              <a:t>02/12/2025</a:t>
+              <a:t>02/17/2025</a:t>
             </a:fld>
             <a:endParaRPr lang="en-US"/>
           </a:p>
@@ -3242,7 +3339,7 @@
           <a:p>
             <a:fld id="{3B0B9679-443A-4C20-8F8C-A3D398E717DE}" type="datetimeFigureOut">
               <a:rPr lang="en-US" smtClean="0"/>
-              <a:t>02/12/2025</a:t>
+              <a:t>02/17/2025</a:t>
             </a:fld>
             <a:endParaRPr lang="en-US"/>
           </a:p>
@@ -3553,7 +3650,7 @@
           <a:p>
             <a:fld id="{3B0B9679-443A-4C20-8F8C-A3D398E717DE}" type="datetimeFigureOut">
               <a:rPr lang="en-US" smtClean="0"/>
-              <a:t>02/12/2025</a:t>
+              <a:t>02/17/2025</a:t>
             </a:fld>
             <a:endParaRPr lang="en-US"/>
           </a:p>
@@ -3841,7 +3938,7 @@
           <a:p>
             <a:fld id="{3B0B9679-443A-4C20-8F8C-A3D398E717DE}" type="datetimeFigureOut">
               <a:rPr lang="en-US" smtClean="0"/>
-              <a:t>02/12/2025</a:t>
+              <a:t>02/17/2025</a:t>
             </a:fld>
             <a:endParaRPr lang="en-US"/>
           </a:p>
@@ -4082,7 +4179,7 @@
           <a:p>
             <a:fld id="{3B0B9679-443A-4C20-8F8C-A3D398E717DE}" type="datetimeFigureOut">
               <a:rPr lang="en-US" smtClean="0"/>
-              <a:t>02/12/2025</a:t>
+              <a:t>02/17/2025</a:t>
             </a:fld>
             <a:endParaRPr lang="en-US"/>
           </a:p>
@@ -7972,6 +8069,670 @@
 </p:sld>
 </file>
 
+<file path=ppt/slides/slide13.xml><?xml version="1.0" encoding="utf-8"?>
+<p:sld xmlns:a="http://schemas.openxmlformats.org/drawingml/2006/main" xmlns:r="http://schemas.openxmlformats.org/officeDocument/2006/relationships" xmlns:p="http://schemas.openxmlformats.org/presentationml/2006/main">
+  <p:cSld>
+    <p:spTree>
+      <p:nvGrpSpPr>
+        <p:cNvPr id="1" name=""/>
+        <p:cNvGrpSpPr/>
+        <p:nvPr/>
+      </p:nvGrpSpPr>
+      <p:grpSpPr>
+        <a:xfrm>
+          <a:off x="0" y="0"/>
+          <a:ext cx="0" cy="0"/>
+          <a:chOff x="0" y="0"/>
+          <a:chExt cx="0" cy="0"/>
+        </a:xfrm>
+      </p:grpSpPr>
+      <p:sp>
+        <p:nvSpPr>
+          <p:cNvPr id="2" name="Rectangle 1">
+            <a:extLst>
+              <a:ext uri="{FF2B5EF4-FFF2-40B4-BE49-F238E27FC236}">
+                <a16:creationId xmlns:a16="http://schemas.microsoft.com/office/drawing/2014/main" id="{DF319A74-428A-DC3E-565A-F64889F51A1B}"/>
+              </a:ext>
+            </a:extLst>
+          </p:cNvPr>
+          <p:cNvSpPr/>
+          <p:nvPr/>
+        </p:nvSpPr>
+        <p:spPr>
+          <a:xfrm>
+            <a:off x="946672" y="978947"/>
+            <a:ext cx="4270783" cy="484094"/>
+          </a:xfrm>
+          <a:prstGeom prst="rect">
+            <a:avLst/>
+          </a:prstGeom>
+          <a:solidFill>
+            <a:schemeClr val="accent4">
+              <a:lumMod val="20000"/>
+              <a:lumOff val="80000"/>
+            </a:schemeClr>
+          </a:solidFill>
+        </p:spPr>
+        <p:style>
+          <a:lnRef idx="2">
+            <a:schemeClr val="accent1">
+              <a:shade val="15000"/>
+            </a:schemeClr>
+          </a:lnRef>
+          <a:fillRef idx="1">
+            <a:schemeClr val="accent1"/>
+          </a:fillRef>
+          <a:effectRef idx="0">
+            <a:schemeClr val="accent1"/>
+          </a:effectRef>
+          <a:fontRef idx="minor">
+            <a:schemeClr val="lt1"/>
+          </a:fontRef>
+        </p:style>
+        <p:txBody>
+          <a:bodyPr rtlCol="0" anchor="ctr"/>
+          <a:lstStyle/>
+          <a:p>
+            <a:r>
+              <a:rPr lang="en-US" dirty="0">
+                <a:solidFill>
+                  <a:schemeClr val="tx1"/>
+                </a:solidFill>
+              </a:rPr>
+              <a:t>Arc, Curve, Line, Transit</a:t>
+            </a:r>
+          </a:p>
+        </p:txBody>
+      </p:sp>
+      <p:sp>
+        <p:nvSpPr>
+          <p:cNvPr id="3" name="Rectangle 2">
+            <a:extLst>
+              <a:ext uri="{FF2B5EF4-FFF2-40B4-BE49-F238E27FC236}">
+                <a16:creationId xmlns:a16="http://schemas.microsoft.com/office/drawing/2014/main" id="{856500C9-CB3E-4926-62A9-5F8FE11E55DF}"/>
+              </a:ext>
+            </a:extLst>
+          </p:cNvPr>
+          <p:cNvSpPr/>
+          <p:nvPr/>
+        </p:nvSpPr>
+        <p:spPr>
+          <a:xfrm>
+            <a:off x="6402592" y="978947"/>
+            <a:ext cx="4270783" cy="484094"/>
+          </a:xfrm>
+          <a:prstGeom prst="rect">
+            <a:avLst/>
+          </a:prstGeom>
+          <a:solidFill>
+            <a:schemeClr val="accent4">
+              <a:lumMod val="20000"/>
+              <a:lumOff val="80000"/>
+            </a:schemeClr>
+          </a:solidFill>
+        </p:spPr>
+        <p:style>
+          <a:lnRef idx="2">
+            <a:schemeClr val="accent1">
+              <a:shade val="15000"/>
+            </a:schemeClr>
+          </a:lnRef>
+          <a:fillRef idx="1">
+            <a:schemeClr val="accent1"/>
+          </a:fillRef>
+          <a:effectRef idx="0">
+            <a:schemeClr val="accent1"/>
+          </a:effectRef>
+          <a:fontRef idx="minor">
+            <a:schemeClr val="lt1"/>
+          </a:fontRef>
+        </p:style>
+        <p:txBody>
+          <a:bodyPr rtlCol="0" anchor="ctr"/>
+          <a:lstStyle/>
+          <a:p>
+            <a:r>
+              <a:rPr lang="en-US" dirty="0">
+                <a:solidFill>
+                  <a:schemeClr val="tx1"/>
+                </a:solidFill>
+              </a:rPr>
+              <a:t>Closed Shape</a:t>
+            </a:r>
+          </a:p>
+        </p:txBody>
+      </p:sp>
+      <p:sp>
+        <p:nvSpPr>
+          <p:cNvPr id="4" name="Rectangle 3">
+            <a:extLst>
+              <a:ext uri="{FF2B5EF4-FFF2-40B4-BE49-F238E27FC236}">
+                <a16:creationId xmlns:a16="http://schemas.microsoft.com/office/drawing/2014/main" id="{6AB504C9-0E0C-6E09-59C6-98A5E7724595}"/>
+              </a:ext>
+            </a:extLst>
+          </p:cNvPr>
+          <p:cNvSpPr/>
+          <p:nvPr/>
+        </p:nvSpPr>
+        <p:spPr>
+          <a:xfrm>
+            <a:off x="946672" y="1593926"/>
+            <a:ext cx="4270787" cy="654422"/>
+          </a:xfrm>
+          <a:prstGeom prst="rect">
+            <a:avLst/>
+          </a:prstGeom>
+          <a:solidFill>
+            <a:srgbClr val="FFFFF1"/>
+          </a:solidFill>
+        </p:spPr>
+        <p:style>
+          <a:lnRef idx="2">
+            <a:schemeClr val="accent1">
+              <a:shade val="15000"/>
+            </a:schemeClr>
+          </a:lnRef>
+          <a:fillRef idx="1">
+            <a:schemeClr val="accent1"/>
+          </a:fillRef>
+          <a:effectRef idx="0">
+            <a:schemeClr val="accent1"/>
+          </a:effectRef>
+          <a:fontRef idx="minor">
+            <a:schemeClr val="lt1"/>
+          </a:fontRef>
+        </p:style>
+        <p:txBody>
+          <a:bodyPr rtlCol="0" anchor="ctr"/>
+          <a:lstStyle/>
+          <a:p>
+            <a:r>
+              <a:rPr lang="en-US" b="1" dirty="0">
+                <a:solidFill>
+                  <a:schemeClr val="tx1"/>
+                </a:solidFill>
+              </a:rPr>
+              <a:t>Operation Start Offset</a:t>
+            </a:r>
+            <a:r>
+              <a:rPr lang="en-US" dirty="0">
+                <a:solidFill>
+                  <a:schemeClr val="tx1"/>
+                </a:solidFill>
+              </a:rPr>
+              <a:t> - Tool position prior to shape = previous End Offset.</a:t>
+            </a:r>
+          </a:p>
+        </p:txBody>
+      </p:sp>
+      <p:sp>
+        <p:nvSpPr>
+          <p:cNvPr id="5" name="Rectangle 4">
+            <a:extLst>
+              <a:ext uri="{FF2B5EF4-FFF2-40B4-BE49-F238E27FC236}">
+                <a16:creationId xmlns:a16="http://schemas.microsoft.com/office/drawing/2014/main" id="{79671D44-18A7-7096-0655-0A2B2C58D0AB}"/>
+              </a:ext>
+            </a:extLst>
+          </p:cNvPr>
+          <p:cNvSpPr/>
+          <p:nvPr/>
+        </p:nvSpPr>
+        <p:spPr>
+          <a:xfrm>
+            <a:off x="946670" y="2379233"/>
+            <a:ext cx="4270787" cy="654422"/>
+          </a:xfrm>
+          <a:prstGeom prst="rect">
+            <a:avLst/>
+          </a:prstGeom>
+          <a:solidFill>
+            <a:srgbClr val="F2AA84"/>
+          </a:solidFill>
+        </p:spPr>
+        <p:style>
+          <a:lnRef idx="2">
+            <a:schemeClr val="accent1">
+              <a:shade val="15000"/>
+            </a:schemeClr>
+          </a:lnRef>
+          <a:fillRef idx="1">
+            <a:schemeClr val="accent1"/>
+          </a:fillRef>
+          <a:effectRef idx="0">
+            <a:schemeClr val="accent1"/>
+          </a:effectRef>
+          <a:fontRef idx="minor">
+            <a:schemeClr val="lt1"/>
+          </a:fontRef>
+        </p:style>
+        <p:txBody>
+          <a:bodyPr rtlCol="0" anchor="ctr"/>
+          <a:lstStyle/>
+          <a:p>
+            <a:r>
+              <a:rPr lang="en-US" b="1" dirty="0">
+                <a:solidFill>
+                  <a:schemeClr val="tx1"/>
+                </a:solidFill>
+              </a:rPr>
+              <a:t>Start Offset</a:t>
+            </a:r>
+            <a:r>
+              <a:rPr lang="en-US" dirty="0">
+                <a:solidFill>
+                  <a:schemeClr val="tx1"/>
+                </a:solidFill>
+              </a:rPr>
+              <a:t> - Start of shape.</a:t>
+            </a:r>
+          </a:p>
+        </p:txBody>
+      </p:sp>
+      <p:sp>
+        <p:nvSpPr>
+          <p:cNvPr id="6" name="Rectangle 5">
+            <a:extLst>
+              <a:ext uri="{FF2B5EF4-FFF2-40B4-BE49-F238E27FC236}">
+                <a16:creationId xmlns:a16="http://schemas.microsoft.com/office/drawing/2014/main" id="{FD6B4D3C-B73B-A82E-077F-319AE8DCDEFB}"/>
+              </a:ext>
+            </a:extLst>
+          </p:cNvPr>
+          <p:cNvSpPr/>
+          <p:nvPr/>
+        </p:nvSpPr>
+        <p:spPr>
+          <a:xfrm>
+            <a:off x="946669" y="3169924"/>
+            <a:ext cx="4270787" cy="654422"/>
+          </a:xfrm>
+          <a:prstGeom prst="rect">
+            <a:avLst/>
+          </a:prstGeom>
+          <a:solidFill>
+            <a:schemeClr val="accent3">
+              <a:lumMod val="20000"/>
+              <a:lumOff val="80000"/>
+            </a:schemeClr>
+          </a:solidFill>
+        </p:spPr>
+        <p:style>
+          <a:lnRef idx="2">
+            <a:schemeClr val="accent1">
+              <a:shade val="15000"/>
+            </a:schemeClr>
+          </a:lnRef>
+          <a:fillRef idx="1">
+            <a:schemeClr val="accent1"/>
+          </a:fillRef>
+          <a:effectRef idx="0">
+            <a:schemeClr val="accent1"/>
+          </a:effectRef>
+          <a:fontRef idx="minor">
+            <a:schemeClr val="lt1"/>
+          </a:fontRef>
+        </p:style>
+        <p:txBody>
+          <a:bodyPr rtlCol="0" anchor="ctr"/>
+          <a:lstStyle/>
+          <a:p>
+            <a:r>
+              <a:rPr lang="en-US" b="1" dirty="0">
+                <a:solidFill>
+                  <a:schemeClr val="tx1"/>
+                </a:solidFill>
+              </a:rPr>
+              <a:t>End Offset</a:t>
+            </a:r>
+            <a:r>
+              <a:rPr lang="en-US" dirty="0">
+                <a:solidFill>
+                  <a:schemeClr val="tx1"/>
+                </a:solidFill>
+              </a:rPr>
+              <a:t> - End of shape.</a:t>
+            </a:r>
+          </a:p>
+        </p:txBody>
+      </p:sp>
+      <p:sp>
+        <p:nvSpPr>
+          <p:cNvPr id="7" name="Rectangle 6">
+            <a:extLst>
+              <a:ext uri="{FF2B5EF4-FFF2-40B4-BE49-F238E27FC236}">
+                <a16:creationId xmlns:a16="http://schemas.microsoft.com/office/drawing/2014/main" id="{46B114B0-1AE5-86AC-C21A-54EBD4A04A79}"/>
+              </a:ext>
+            </a:extLst>
+          </p:cNvPr>
+          <p:cNvSpPr/>
+          <p:nvPr/>
+        </p:nvSpPr>
+        <p:spPr>
+          <a:xfrm>
+            <a:off x="6402593" y="1593926"/>
+            <a:ext cx="4270787" cy="654422"/>
+          </a:xfrm>
+          <a:prstGeom prst="rect">
+            <a:avLst/>
+          </a:prstGeom>
+          <a:solidFill>
+            <a:srgbClr val="FFFFF1"/>
+          </a:solidFill>
+        </p:spPr>
+        <p:style>
+          <a:lnRef idx="2">
+            <a:schemeClr val="accent1">
+              <a:shade val="15000"/>
+            </a:schemeClr>
+          </a:lnRef>
+          <a:fillRef idx="1">
+            <a:schemeClr val="accent1"/>
+          </a:fillRef>
+          <a:effectRef idx="0">
+            <a:schemeClr val="accent1"/>
+          </a:effectRef>
+          <a:fontRef idx="minor">
+            <a:schemeClr val="lt1"/>
+          </a:fontRef>
+        </p:style>
+        <p:txBody>
+          <a:bodyPr rtlCol="0" anchor="ctr"/>
+          <a:lstStyle/>
+          <a:p>
+            <a:r>
+              <a:rPr lang="en-US" sz="1600" b="1" dirty="0">
+                <a:solidFill>
+                  <a:schemeClr val="tx1"/>
+                </a:solidFill>
+              </a:rPr>
+              <a:t>Operation Start Offset</a:t>
+            </a:r>
+            <a:r>
+              <a:rPr lang="en-US" sz="1600" dirty="0">
+                <a:solidFill>
+                  <a:schemeClr val="tx1"/>
+                </a:solidFill>
+              </a:rPr>
+              <a:t> - Tool position prior to shape = previous End Operation Offset.</a:t>
+            </a:r>
+          </a:p>
+        </p:txBody>
+      </p:sp>
+      <p:sp>
+        <p:nvSpPr>
+          <p:cNvPr id="8" name="Rectangle 7">
+            <a:extLst>
+              <a:ext uri="{FF2B5EF4-FFF2-40B4-BE49-F238E27FC236}">
+                <a16:creationId xmlns:a16="http://schemas.microsoft.com/office/drawing/2014/main" id="{32309524-E642-4147-8A99-5CE5913E0640}"/>
+              </a:ext>
+            </a:extLst>
+          </p:cNvPr>
+          <p:cNvSpPr/>
+          <p:nvPr/>
+        </p:nvSpPr>
+        <p:spPr>
+          <a:xfrm>
+            <a:off x="6402593" y="2379233"/>
+            <a:ext cx="4270787" cy="654422"/>
+          </a:xfrm>
+          <a:prstGeom prst="rect">
+            <a:avLst/>
+          </a:prstGeom>
+          <a:solidFill>
+            <a:srgbClr val="F8D4C0"/>
+          </a:solidFill>
+        </p:spPr>
+        <p:style>
+          <a:lnRef idx="2">
+            <a:schemeClr val="accent1">
+              <a:shade val="15000"/>
+            </a:schemeClr>
+          </a:lnRef>
+          <a:fillRef idx="1">
+            <a:schemeClr val="accent1"/>
+          </a:fillRef>
+          <a:effectRef idx="0">
+            <a:schemeClr val="accent1"/>
+          </a:effectRef>
+          <a:fontRef idx="minor">
+            <a:schemeClr val="lt1"/>
+          </a:fontRef>
+        </p:style>
+        <p:txBody>
+          <a:bodyPr rtlCol="0" anchor="ctr"/>
+          <a:lstStyle/>
+          <a:p>
+            <a:r>
+              <a:rPr lang="en-US" b="1" dirty="0">
+                <a:solidFill>
+                  <a:schemeClr val="tx1"/>
+                </a:solidFill>
+              </a:rPr>
+              <a:t>Start Offset</a:t>
+            </a:r>
+            <a:r>
+              <a:rPr lang="en-US" dirty="0">
+                <a:solidFill>
+                  <a:schemeClr val="tx1"/>
+                </a:solidFill>
+              </a:rPr>
+              <a:t> - Reference location on shape. Tool doesn't visit this location.</a:t>
+            </a:r>
+          </a:p>
+        </p:txBody>
+      </p:sp>
+      <p:sp>
+        <p:nvSpPr>
+          <p:cNvPr id="9" name="Rectangle 8">
+            <a:extLst>
+              <a:ext uri="{FF2B5EF4-FFF2-40B4-BE49-F238E27FC236}">
+                <a16:creationId xmlns:a16="http://schemas.microsoft.com/office/drawing/2014/main" id="{E1577018-C84C-737D-4D08-351B3E1E2FAE}"/>
+              </a:ext>
+            </a:extLst>
+          </p:cNvPr>
+          <p:cNvSpPr/>
+          <p:nvPr/>
+        </p:nvSpPr>
+        <p:spPr>
+          <a:xfrm>
+            <a:off x="6402593" y="3164540"/>
+            <a:ext cx="4270787" cy="654422"/>
+          </a:xfrm>
+          <a:prstGeom prst="rect">
+            <a:avLst/>
+          </a:prstGeom>
+          <a:solidFill>
+            <a:srgbClr val="F8D4C0"/>
+          </a:solidFill>
+        </p:spPr>
+        <p:style>
+          <a:lnRef idx="2">
+            <a:schemeClr val="accent1">
+              <a:shade val="15000"/>
+            </a:schemeClr>
+          </a:lnRef>
+          <a:fillRef idx="1">
+            <a:schemeClr val="accent1"/>
+          </a:fillRef>
+          <a:effectRef idx="0">
+            <a:schemeClr val="accent1"/>
+          </a:effectRef>
+          <a:fontRef idx="minor">
+            <a:schemeClr val="lt1"/>
+          </a:fontRef>
+        </p:style>
+        <p:txBody>
+          <a:bodyPr rtlCol="0" anchor="ctr"/>
+          <a:lstStyle/>
+          <a:p>
+            <a:r>
+              <a:rPr lang="en-US" b="1" dirty="0">
+                <a:solidFill>
+                  <a:schemeClr val="tx1"/>
+                </a:solidFill>
+              </a:rPr>
+              <a:t>End Offset</a:t>
+            </a:r>
+            <a:r>
+              <a:rPr lang="en-US" dirty="0">
+                <a:solidFill>
+                  <a:schemeClr val="tx1"/>
+                </a:solidFill>
+              </a:rPr>
+              <a:t> = Start Offset.</a:t>
+            </a:r>
+          </a:p>
+        </p:txBody>
+      </p:sp>
+      <p:sp>
+        <p:nvSpPr>
+          <p:cNvPr id="10" name="Rectangle 9">
+            <a:extLst>
+              <a:ext uri="{FF2B5EF4-FFF2-40B4-BE49-F238E27FC236}">
+                <a16:creationId xmlns:a16="http://schemas.microsoft.com/office/drawing/2014/main" id="{39EDDAE7-0926-89CB-C06B-BFA05EF8E92B}"/>
+              </a:ext>
+            </a:extLst>
+          </p:cNvPr>
+          <p:cNvSpPr/>
+          <p:nvPr/>
+        </p:nvSpPr>
+        <p:spPr>
+          <a:xfrm>
+            <a:off x="6402593" y="3949847"/>
+            <a:ext cx="4270787" cy="654422"/>
+          </a:xfrm>
+          <a:prstGeom prst="rect">
+            <a:avLst/>
+          </a:prstGeom>
+          <a:solidFill>
+            <a:srgbClr val="FFFFF1"/>
+          </a:solidFill>
+        </p:spPr>
+        <p:style>
+          <a:lnRef idx="2">
+            <a:schemeClr val="accent1">
+              <a:shade val="15000"/>
+            </a:schemeClr>
+          </a:lnRef>
+          <a:fillRef idx="1">
+            <a:schemeClr val="accent1"/>
+          </a:fillRef>
+          <a:effectRef idx="0">
+            <a:schemeClr val="accent1"/>
+          </a:effectRef>
+          <a:fontRef idx="minor">
+            <a:schemeClr val="lt1"/>
+          </a:fontRef>
+        </p:style>
+        <p:txBody>
+          <a:bodyPr rtlCol="0" anchor="ctr"/>
+          <a:lstStyle/>
+          <a:p>
+            <a:r>
+              <a:rPr lang="en-US" b="1" dirty="0">
+                <a:solidFill>
+                  <a:schemeClr val="tx1"/>
+                </a:solidFill>
+              </a:rPr>
+              <a:t>Operation End Offset</a:t>
+            </a:r>
+            <a:r>
+              <a:rPr lang="en-US" dirty="0">
+                <a:solidFill>
+                  <a:schemeClr val="tx1"/>
+                </a:solidFill>
+              </a:rPr>
+              <a:t> = Operation Start Offset.</a:t>
+            </a:r>
+          </a:p>
+        </p:txBody>
+      </p:sp>
+      <p:sp>
+        <p:nvSpPr>
+          <p:cNvPr id="11" name="Rectangle 10">
+            <a:extLst>
+              <a:ext uri="{FF2B5EF4-FFF2-40B4-BE49-F238E27FC236}">
+                <a16:creationId xmlns:a16="http://schemas.microsoft.com/office/drawing/2014/main" id="{E0E17102-FB77-9510-5F23-B4D1ABE0B8E9}"/>
+              </a:ext>
+            </a:extLst>
+          </p:cNvPr>
+          <p:cNvSpPr/>
+          <p:nvPr/>
+        </p:nvSpPr>
+        <p:spPr>
+          <a:xfrm>
+            <a:off x="946669" y="3960615"/>
+            <a:ext cx="4270787" cy="654422"/>
+          </a:xfrm>
+          <a:prstGeom prst="rect">
+            <a:avLst/>
+          </a:prstGeom>
+          <a:solidFill>
+            <a:schemeClr val="bg1"/>
+          </a:solidFill>
+          <a:ln>
+            <a:solidFill>
+              <a:schemeClr val="bg1">
+                <a:lumMod val="85000"/>
+              </a:schemeClr>
+            </a:solidFill>
+          </a:ln>
+        </p:spPr>
+        <p:style>
+          <a:lnRef idx="2">
+            <a:schemeClr val="accent1">
+              <a:shade val="15000"/>
+            </a:schemeClr>
+          </a:lnRef>
+          <a:fillRef idx="1">
+            <a:schemeClr val="accent1"/>
+          </a:fillRef>
+          <a:effectRef idx="0">
+            <a:schemeClr val="accent1"/>
+          </a:effectRef>
+          <a:fontRef idx="minor">
+            <a:schemeClr val="lt1"/>
+          </a:fontRef>
+        </p:style>
+        <p:txBody>
+          <a:bodyPr rtlCol="0" anchor="ctr"/>
+          <a:lstStyle/>
+          <a:p>
+            <a:r>
+              <a:rPr lang="en-US" b="1" dirty="0">
+                <a:solidFill>
+                  <a:schemeClr val="bg1">
+                    <a:lumMod val="85000"/>
+                  </a:schemeClr>
+                </a:solidFill>
+              </a:rPr>
+              <a:t>Operation End Offset</a:t>
+            </a:r>
+            <a:r>
+              <a:rPr lang="en-US" dirty="0">
+                <a:solidFill>
+                  <a:schemeClr val="bg1">
+                    <a:lumMod val="85000"/>
+                  </a:schemeClr>
+                </a:solidFill>
+              </a:rPr>
+              <a:t> = End Offset.</a:t>
+            </a:r>
+          </a:p>
+        </p:txBody>
+      </p:sp>
+    </p:spTree>
+    <p:extLst>
+      <p:ext uri="{BB962C8B-B14F-4D97-AF65-F5344CB8AC3E}">
+        <p14:creationId xmlns:p14="http://schemas.microsoft.com/office/powerpoint/2010/main" val="845684127"/>
+      </p:ext>
+    </p:extLst>
+  </p:cSld>
+  <p:clrMapOvr>
+    <a:masterClrMapping/>
+  </p:clrMapOvr>
+</p:sld>
+</file>
+
 <file path=ppt/slides/slide2.xml><?xml version="1.0" encoding="utf-8"?>
 <p:sld xmlns:a="http://schemas.openxmlformats.org/drawingml/2006/main" xmlns:r="http://schemas.openxmlformats.org/officeDocument/2006/relationships" xmlns:p="http://schemas.openxmlformats.org/presentationml/2006/main">
   <p:cSld>

</xml_diff>